<commit_message>
Created a lot more design pattern examples
</commit_message>
<xml_diff>
--- a/Design patterns.pptx
+++ b/Design patterns.pptx
@@ -227,7 +227,7 @@
           <a:p>
             <a:fld id="{746300F8-CAAE-4197-B7D5-DE999F85E4F6}" type="datetimeFigureOut">
               <a:rPr lang="en-US" smtClean="0"/>
-              <a:t>12-Oct-18</a:t>
+              <a:t>15-Oct-18</a:t>
             </a:fld>
             <a:endParaRPr lang="en-US"/>
           </a:p>
@@ -1611,7 +1611,7 @@
           <a:p>
             <a:fld id="{AA309A6D-C09C-4548-B29A-6CF363A7E532}" type="datetimeFigureOut">
               <a:rPr lang="fr-FR" smtClean="0"/>
-              <a:t>12/10/2018</a:t>
+              <a:t>15/10/2018</a:t>
             </a:fld>
             <a:endParaRPr lang="fr-BE"/>
           </a:p>
@@ -1775,7 +1775,7 @@
           <a:p>
             <a:fld id="{AA309A6D-C09C-4548-B29A-6CF363A7E532}" type="datetimeFigureOut">
               <a:rPr lang="fr-FR" smtClean="0"/>
-              <a:t>12/10/2018</a:t>
+              <a:t>15/10/2018</a:t>
             </a:fld>
             <a:endParaRPr lang="fr-BE"/>
           </a:p>
@@ -1949,7 +1949,7 @@
           <a:p>
             <a:fld id="{AA309A6D-C09C-4548-B29A-6CF363A7E532}" type="datetimeFigureOut">
               <a:rPr lang="fr-FR" smtClean="0"/>
-              <a:t>12/10/2018</a:t>
+              <a:t>15/10/2018</a:t>
             </a:fld>
             <a:endParaRPr lang="fr-BE"/>
           </a:p>
@@ -2113,7 +2113,7 @@
           <a:p>
             <a:fld id="{AA309A6D-C09C-4548-B29A-6CF363A7E532}" type="datetimeFigureOut">
               <a:rPr lang="fr-FR" smtClean="0"/>
-              <a:t>12/10/2018</a:t>
+              <a:t>15/10/2018</a:t>
             </a:fld>
             <a:endParaRPr lang="fr-BE"/>
           </a:p>
@@ -2354,7 +2354,7 @@
           <a:p>
             <a:fld id="{AA309A6D-C09C-4548-B29A-6CF363A7E532}" type="datetimeFigureOut">
               <a:rPr lang="fr-FR" smtClean="0"/>
-              <a:t>12/10/2018</a:t>
+              <a:t>15/10/2018</a:t>
             </a:fld>
             <a:endParaRPr lang="fr-BE"/>
           </a:p>
@@ -2617,7 +2617,7 @@
           <a:p>
             <a:fld id="{AA309A6D-C09C-4548-B29A-6CF363A7E532}" type="datetimeFigureOut">
               <a:rPr lang="fr-FR" smtClean="0"/>
-              <a:t>12/10/2018</a:t>
+              <a:t>15/10/2018</a:t>
             </a:fld>
             <a:endParaRPr lang="fr-BE"/>
           </a:p>
@@ -2994,7 +2994,7 @@
           <a:p>
             <a:fld id="{AA309A6D-C09C-4548-B29A-6CF363A7E532}" type="datetimeFigureOut">
               <a:rPr lang="fr-FR" smtClean="0"/>
-              <a:t>12/10/2018</a:t>
+              <a:t>15/10/2018</a:t>
             </a:fld>
             <a:endParaRPr lang="fr-BE"/>
           </a:p>
@@ -3143,7 +3143,7 @@
           <a:p>
             <a:fld id="{AA309A6D-C09C-4548-B29A-6CF363A7E532}" type="datetimeFigureOut">
               <a:rPr lang="fr-FR" smtClean="0"/>
-              <a:t>12/10/2018</a:t>
+              <a:t>15/10/2018</a:t>
             </a:fld>
             <a:endParaRPr lang="fr-BE"/>
           </a:p>
@@ -3233,7 +3233,7 @@
           <a:p>
             <a:fld id="{AA309A6D-C09C-4548-B29A-6CF363A7E532}" type="datetimeFigureOut">
               <a:rPr lang="fr-FR" smtClean="0"/>
-              <a:t>12/10/2018</a:t>
+              <a:t>15/10/2018</a:t>
             </a:fld>
             <a:endParaRPr lang="fr-BE"/>
           </a:p>
@@ -3493,7 +3493,7 @@
           <a:p>
             <a:fld id="{AA309A6D-C09C-4548-B29A-6CF363A7E532}" type="datetimeFigureOut">
               <a:rPr lang="fr-FR" smtClean="0"/>
-              <a:t>12/10/2018</a:t>
+              <a:t>15/10/2018</a:t>
             </a:fld>
             <a:endParaRPr lang="fr-BE"/>
           </a:p>
@@ -3780,7 +3780,7 @@
           <a:p>
             <a:fld id="{AA309A6D-C09C-4548-B29A-6CF363A7E532}" type="datetimeFigureOut">
               <a:rPr lang="fr-FR" smtClean="0"/>
-              <a:t>12/10/2018</a:t>
+              <a:t>15/10/2018</a:t>
             </a:fld>
             <a:endParaRPr lang="fr-BE"/>
           </a:p>
@@ -4549,7 +4549,7 @@
           <a:p>
             <a:fld id="{AA309A6D-C09C-4548-B29A-6CF363A7E532}" type="datetimeFigureOut">
               <a:rPr lang="fr-FR" smtClean="0"/>
-              <a:t>12/10/2018</a:t>
+              <a:t>15/10/2018</a:t>
             </a:fld>
             <a:endParaRPr lang="fr-BE"/>
           </a:p>
@@ -5458,7 +5458,7 @@
                   </a:outerShdw>
                 </a:effectLst>
               </a:rPr>
-              <a:t>Les patterns courants</a:t>
+              <a:t>Des patterns importants</a:t>
             </a:r>
           </a:p>
           <a:p>

</xml_diff>

<commit_message>
Update du powerpoint avec deux slides Questions + Partie technique
</commit_message>
<xml_diff>
--- a/Design patterns.pptx
+++ b/Design patterns.pptx
@@ -5,7 +5,7 @@
     <p:sldMasterId id="2147483660" r:id="rId1"/>
   </p:sldMasterIdLst>
   <p:notesMasterIdLst>
-    <p:notesMasterId r:id="rId20"/>
+    <p:notesMasterId r:id="rId22"/>
   </p:notesMasterIdLst>
   <p:sldIdLst>
     <p:sldId id="256" r:id="rId2"/>
@@ -18,14 +18,16 @@
     <p:sldId id="260" r:id="rId9"/>
     <p:sldId id="268" r:id="rId10"/>
     <p:sldId id="280" r:id="rId11"/>
-    <p:sldId id="281" r:id="rId12"/>
-    <p:sldId id="274" r:id="rId13"/>
-    <p:sldId id="273" r:id="rId14"/>
-    <p:sldId id="275" r:id="rId15"/>
-    <p:sldId id="276" r:id="rId16"/>
-    <p:sldId id="278" r:id="rId17"/>
-    <p:sldId id="279" r:id="rId18"/>
-    <p:sldId id="267" r:id="rId19"/>
+    <p:sldId id="283" r:id="rId12"/>
+    <p:sldId id="282" r:id="rId13"/>
+    <p:sldId id="281" r:id="rId14"/>
+    <p:sldId id="274" r:id="rId15"/>
+    <p:sldId id="273" r:id="rId16"/>
+    <p:sldId id="275" r:id="rId17"/>
+    <p:sldId id="276" r:id="rId18"/>
+    <p:sldId id="278" r:id="rId19"/>
+    <p:sldId id="279" r:id="rId20"/>
+    <p:sldId id="267" r:id="rId21"/>
   </p:sldIdLst>
   <p:sldSz cx="9144000" cy="6858000" type="screen4x3"/>
   <p:notesSz cx="6858000" cy="9144000"/>
@@ -125,6 +127,34 @@
     </a:lvl9pPr>
   </p:defaultTextStyle>
   <p:extLst>
+    <p:ext uri="{521415D9-36F7-43E2-AB2F-B90AF26B5E84}">
+      <p14:sectionLst xmlns:p14="http://schemas.microsoft.com/office/powerpoint/2010/main">
+        <p14:section name="Default Section" id="{14F05C18-C751-46D5-8D9D-44EDF6DD5E88}">
+          <p14:sldIdLst>
+            <p14:sldId id="256"/>
+            <p14:sldId id="258"/>
+            <p14:sldId id="262"/>
+            <p14:sldId id="259"/>
+            <p14:sldId id="263"/>
+            <p14:sldId id="264"/>
+            <p14:sldId id="265"/>
+            <p14:sldId id="260"/>
+            <p14:sldId id="268"/>
+            <p14:sldId id="280"/>
+            <p14:sldId id="283"/>
+            <p14:sldId id="282"/>
+            <p14:sldId id="281"/>
+            <p14:sldId id="274"/>
+            <p14:sldId id="273"/>
+            <p14:sldId id="275"/>
+            <p14:sldId id="276"/>
+            <p14:sldId id="278"/>
+            <p14:sldId id="279"/>
+            <p14:sldId id="267"/>
+          </p14:sldIdLst>
+        </p14:section>
+      </p14:sectionLst>
+    </p:ext>
     <p:ext uri="{EFAFB233-063F-42B5-8137-9DF3F51BA10A}">
       <p15:sldGuideLst xmlns:p15="http://schemas.microsoft.com/office/powerpoint/2012/main">
         <p15:guide id="1" orient="horz" pos="2160">
@@ -225,7 +255,7 @@
           <a:p>
             <a:fld id="{746300F8-CAAE-4197-B7D5-DE999F85E4F6}" type="datetimeFigureOut">
               <a:rPr lang="en-US" smtClean="0"/>
-              <a:t>18-Oct-18</a:t>
+              <a:t>22-Oct-18</a:t>
             </a:fld>
             <a:endParaRPr lang="en-US"/>
           </a:p>
@@ -1609,7 +1639,7 @@
           <a:p>
             <a:fld id="{AA309A6D-C09C-4548-B29A-6CF363A7E532}" type="datetimeFigureOut">
               <a:rPr lang="fr-FR" smtClean="0"/>
-              <a:t>18/10/2018</a:t>
+              <a:t>22/10/2018</a:t>
             </a:fld>
             <a:endParaRPr lang="fr-BE"/>
           </a:p>
@@ -1773,7 +1803,7 @@
           <a:p>
             <a:fld id="{AA309A6D-C09C-4548-B29A-6CF363A7E532}" type="datetimeFigureOut">
               <a:rPr lang="fr-FR" smtClean="0"/>
-              <a:t>18/10/2018</a:t>
+              <a:t>22/10/2018</a:t>
             </a:fld>
             <a:endParaRPr lang="fr-BE"/>
           </a:p>
@@ -1947,7 +1977,7 @@
           <a:p>
             <a:fld id="{AA309A6D-C09C-4548-B29A-6CF363A7E532}" type="datetimeFigureOut">
               <a:rPr lang="fr-FR" smtClean="0"/>
-              <a:t>18/10/2018</a:t>
+              <a:t>22/10/2018</a:t>
             </a:fld>
             <a:endParaRPr lang="fr-BE"/>
           </a:p>
@@ -2111,7 +2141,7 @@
           <a:p>
             <a:fld id="{AA309A6D-C09C-4548-B29A-6CF363A7E532}" type="datetimeFigureOut">
               <a:rPr lang="fr-FR" smtClean="0"/>
-              <a:t>18/10/2018</a:t>
+              <a:t>22/10/2018</a:t>
             </a:fld>
             <a:endParaRPr lang="fr-BE"/>
           </a:p>
@@ -2352,7 +2382,7 @@
           <a:p>
             <a:fld id="{AA309A6D-C09C-4548-B29A-6CF363A7E532}" type="datetimeFigureOut">
               <a:rPr lang="fr-FR" smtClean="0"/>
-              <a:t>18/10/2018</a:t>
+              <a:t>22/10/2018</a:t>
             </a:fld>
             <a:endParaRPr lang="fr-BE"/>
           </a:p>
@@ -2615,7 +2645,7 @@
           <a:p>
             <a:fld id="{AA309A6D-C09C-4548-B29A-6CF363A7E532}" type="datetimeFigureOut">
               <a:rPr lang="fr-FR" smtClean="0"/>
-              <a:t>18/10/2018</a:t>
+              <a:t>22/10/2018</a:t>
             </a:fld>
             <a:endParaRPr lang="fr-BE"/>
           </a:p>
@@ -2992,7 +3022,7 @@
           <a:p>
             <a:fld id="{AA309A6D-C09C-4548-B29A-6CF363A7E532}" type="datetimeFigureOut">
               <a:rPr lang="fr-FR" smtClean="0"/>
-              <a:t>18/10/2018</a:t>
+              <a:t>22/10/2018</a:t>
             </a:fld>
             <a:endParaRPr lang="fr-BE"/>
           </a:p>
@@ -3141,7 +3171,7 @@
           <a:p>
             <a:fld id="{AA309A6D-C09C-4548-B29A-6CF363A7E532}" type="datetimeFigureOut">
               <a:rPr lang="fr-FR" smtClean="0"/>
-              <a:t>18/10/2018</a:t>
+              <a:t>22/10/2018</a:t>
             </a:fld>
             <a:endParaRPr lang="fr-BE"/>
           </a:p>
@@ -3231,7 +3261,7 @@
           <a:p>
             <a:fld id="{AA309A6D-C09C-4548-B29A-6CF363A7E532}" type="datetimeFigureOut">
               <a:rPr lang="fr-FR" smtClean="0"/>
-              <a:t>18/10/2018</a:t>
+              <a:t>22/10/2018</a:t>
             </a:fld>
             <a:endParaRPr lang="fr-BE"/>
           </a:p>
@@ -3491,7 +3521,7 @@
           <a:p>
             <a:fld id="{AA309A6D-C09C-4548-B29A-6CF363A7E532}" type="datetimeFigureOut">
               <a:rPr lang="fr-FR" smtClean="0"/>
-              <a:t>18/10/2018</a:t>
+              <a:t>22/10/2018</a:t>
             </a:fld>
             <a:endParaRPr lang="fr-BE"/>
           </a:p>
@@ -3778,7 +3808,7 @@
           <a:p>
             <a:fld id="{AA309A6D-C09C-4548-B29A-6CF363A7E532}" type="datetimeFigureOut">
               <a:rPr lang="fr-FR" smtClean="0"/>
-              <a:t>18/10/2018</a:t>
+              <a:t>22/10/2018</a:t>
             </a:fld>
             <a:endParaRPr lang="fr-BE"/>
           </a:p>
@@ -4547,7 +4577,7 @@
           <a:p>
             <a:fld id="{AA309A6D-C09C-4548-B29A-6CF363A7E532}" type="datetimeFigureOut">
               <a:rPr lang="fr-FR" smtClean="0"/>
-              <a:t>18/10/2018</a:t>
+              <a:t>22/10/2018</a:t>
             </a:fld>
             <a:endParaRPr lang="fr-BE"/>
           </a:p>
@@ -6146,6 +6176,848 @@
       </p:grpSpPr>
       <p:sp>
         <p:nvSpPr>
+          <p:cNvPr id="4" name="Title 3">
+            <a:extLst>
+              <a:ext uri="{FF2B5EF4-FFF2-40B4-BE49-F238E27FC236}">
+                <a16:creationId xmlns:a16="http://schemas.microsoft.com/office/drawing/2014/main" id="{0E10446A-6F2F-4DDA-A63D-12248CBC7323}"/>
+              </a:ext>
+            </a:extLst>
+          </p:cNvPr>
+          <p:cNvSpPr>
+            <a:spLocks noGrp="1"/>
+          </p:cNvSpPr>
+          <p:nvPr>
+            <p:ph type="title"/>
+          </p:nvPr>
+        </p:nvSpPr>
+        <p:spPr/>
+        <p:txBody>
+          <a:bodyPr/>
+          <a:lstStyle/>
+          <a:p>
+            <a:r>
+              <a:rPr lang="en-US" dirty="0"/>
+              <a:t>Questions ?</a:t>
+            </a:r>
+          </a:p>
+        </p:txBody>
+      </p:sp>
+      <p:sp>
+        <p:nvSpPr>
+          <p:cNvPr id="6" name="Text Placeholder 5">
+            <a:extLst>
+              <a:ext uri="{FF2B5EF4-FFF2-40B4-BE49-F238E27FC236}">
+                <a16:creationId xmlns:a16="http://schemas.microsoft.com/office/drawing/2014/main" id="{C02CFE46-AE4A-46C9-A297-844876B6D9F0}"/>
+              </a:ext>
+            </a:extLst>
+          </p:cNvPr>
+          <p:cNvSpPr>
+            <a:spLocks noGrp="1"/>
+          </p:cNvSpPr>
+          <p:nvPr>
+            <p:ph type="body" sz="half" idx="2"/>
+          </p:nvPr>
+        </p:nvSpPr>
+        <p:spPr/>
+        <p:txBody>
+          <a:bodyPr/>
+          <a:lstStyle/>
+          <a:p>
+            <a:endParaRPr lang="en-US"/>
+          </a:p>
+        </p:txBody>
+      </p:sp>
+      <p:pic>
+        <p:nvPicPr>
+          <p:cNvPr id="8" name="Picture Placeholder 7">
+            <a:extLst>
+              <a:ext uri="{FF2B5EF4-FFF2-40B4-BE49-F238E27FC236}">
+                <a16:creationId xmlns:a16="http://schemas.microsoft.com/office/drawing/2014/main" id="{EB61678C-416D-4498-A55A-0E5F1CDD45AF}"/>
+              </a:ext>
+            </a:extLst>
+          </p:cNvPr>
+          <p:cNvPicPr>
+            <a:picLocks noGrp="1" noChangeAspect="1"/>
+          </p:cNvPicPr>
+          <p:nvPr>
+            <p:ph type="pic" idx="1"/>
+          </p:nvPr>
+        </p:nvPicPr>
+        <p:blipFill>
+          <a:blip r:embed="rId2">
+            <a:extLst>
+              <a:ext uri="{28A0092B-C50C-407E-A947-70E740481C1C}">
+                <a14:useLocalDpi xmlns:a14="http://schemas.microsoft.com/office/drawing/2010/main" val="0"/>
+              </a:ext>
+            </a:extLst>
+          </a:blip>
+          <a:srcRect l="21281" r="21281"/>
+          <a:stretch>
+            <a:fillRect/>
+          </a:stretch>
+        </p:blipFill>
+        <p:spPr/>
+      </p:pic>
+    </p:spTree>
+    <p:extLst>
+      <p:ext uri="{BB962C8B-B14F-4D97-AF65-F5344CB8AC3E}">
+        <p14:creationId xmlns:p14="http://schemas.microsoft.com/office/powerpoint/2010/main" val="2393778190"/>
+      </p:ext>
+    </p:extLst>
+  </p:cSld>
+  <p:clrMapOvr>
+    <a:masterClrMapping/>
+  </p:clrMapOvr>
+</p:sld>
+</file>
+
+<file path=ppt/slides/slide12.xml><?xml version="1.0" encoding="utf-8"?>
+<p:sld xmlns:a="http://schemas.openxmlformats.org/drawingml/2006/main" xmlns:r="http://schemas.openxmlformats.org/officeDocument/2006/relationships" xmlns:p="http://schemas.openxmlformats.org/presentationml/2006/main">
+  <p:cSld>
+    <p:spTree>
+      <p:nvGrpSpPr>
+        <p:cNvPr id="1" name=""/>
+        <p:cNvGrpSpPr/>
+        <p:nvPr/>
+      </p:nvGrpSpPr>
+      <p:grpSpPr>
+        <a:xfrm>
+          <a:off x="0" y="0"/>
+          <a:ext cx="0" cy="0"/>
+          <a:chOff x="0" y="0"/>
+          <a:chExt cx="0" cy="0"/>
+        </a:xfrm>
+      </p:grpSpPr>
+      <p:sp>
+        <p:nvSpPr>
+          <p:cNvPr id="6" name="Titre 1">
+            <a:extLst>
+              <a:ext uri="{FF2B5EF4-FFF2-40B4-BE49-F238E27FC236}">
+                <a16:creationId xmlns:a16="http://schemas.microsoft.com/office/drawing/2014/main" id="{86B41339-15B1-4AB0-A829-42109718876E}"/>
+              </a:ext>
+            </a:extLst>
+          </p:cNvPr>
+          <p:cNvSpPr txBox="1">
+            <a:spLocks/>
+          </p:cNvSpPr>
+          <p:nvPr/>
+        </p:nvSpPr>
+        <p:spPr>
+          <a:xfrm>
+            <a:off x="683568" y="332656"/>
+            <a:ext cx="7772400" cy="1470025"/>
+          </a:xfrm>
+          <a:prstGeom prst="rect">
+            <a:avLst/>
+          </a:prstGeom>
+          <a:ln>
+            <a:noFill/>
+          </a:ln>
+        </p:spPr>
+        <p:txBody>
+          <a:bodyPr vert="horz" lIns="0" tIns="0" rIns="18288" bIns="0" anchor="b">
+            <a:normAutofit/>
+            <a:scene3d>
+              <a:camera prst="orthographicFront"/>
+              <a:lightRig rig="freezing" dir="t">
+                <a:rot lat="0" lon="0" rev="5640000"/>
+              </a:lightRig>
+            </a:scene3d>
+            <a:sp3d prstMaterial="flat">
+              <a:bevelT w="38100" h="38100"/>
+              <a:contourClr>
+                <a:schemeClr val="tx2"/>
+              </a:contourClr>
+            </a:sp3d>
+          </a:bodyPr>
+          <a:lstStyle>
+            <a:lvl1pPr algn="r" rtl="0" eaLnBrk="1" latinLnBrk="0" hangingPunct="1">
+              <a:spcBef>
+                <a:spcPct val="0"/>
+              </a:spcBef>
+              <a:buNone/>
+              <a:defRPr kumimoji="0" sz="5600" b="1" kern="1200">
+                <a:ln>
+                  <a:noFill/>
+                </a:ln>
+                <a:solidFill>
+                  <a:schemeClr val="accent3">
+                    <a:tint val="90000"/>
+                    <a:satMod val="120000"/>
+                  </a:schemeClr>
+                </a:solidFill>
+                <a:effectLst>
+                  <a:outerShdw blurRad="38100" dist="25400" dir="5400000" algn="tl" rotWithShape="0">
+                    <a:srgbClr val="000000">
+                      <a:alpha val="43000"/>
+                    </a:srgbClr>
+                  </a:outerShdw>
+                </a:effectLst>
+                <a:latin typeface="+mj-lt"/>
+                <a:ea typeface="+mj-ea"/>
+                <a:cs typeface="+mj-cs"/>
+              </a:defRPr>
+            </a:lvl1pPr>
+          </a:lstStyle>
+          <a:p>
+            <a:r>
+              <a:rPr lang="en-US" sz="6600" dirty="0" err="1"/>
+              <a:t>Partie</a:t>
+            </a:r>
+            <a:r>
+              <a:rPr lang="en-US" sz="6600" dirty="0"/>
+              <a:t> Technique</a:t>
+            </a:r>
+            <a:br>
+              <a:rPr lang="en-US" sz="6600" dirty="0"/>
+            </a:br>
+            <a:r>
+              <a:rPr lang="en-US" sz="2400" dirty="0" err="1"/>
+              <a:t>Exemples</a:t>
+            </a:r>
+            <a:r>
+              <a:rPr lang="en-US" sz="2400" dirty="0"/>
+              <a:t> et atelier</a:t>
+            </a:r>
+          </a:p>
+        </p:txBody>
+      </p:sp>
+      <p:sp>
+        <p:nvSpPr>
+          <p:cNvPr id="11" name="Espace réservé du contenu 2">
+            <a:extLst>
+              <a:ext uri="{FF2B5EF4-FFF2-40B4-BE49-F238E27FC236}">
+                <a16:creationId xmlns:a16="http://schemas.microsoft.com/office/drawing/2014/main" id="{73D6A7A2-14FD-4D83-80F4-02BE28778910}"/>
+              </a:ext>
+            </a:extLst>
+          </p:cNvPr>
+          <p:cNvSpPr txBox="1">
+            <a:spLocks/>
+          </p:cNvSpPr>
+          <p:nvPr/>
+        </p:nvSpPr>
+        <p:spPr>
+          <a:xfrm>
+            <a:off x="454968" y="2996952"/>
+            <a:ext cx="8229600" cy="3705275"/>
+          </a:xfrm>
+          <a:prstGeom prst="rect">
+            <a:avLst/>
+          </a:prstGeom>
+        </p:spPr>
+        <p:txBody>
+          <a:bodyPr vert="horz" lIns="91440" tIns="45720" rIns="91440" bIns="45720" rtlCol="0">
+            <a:noAutofit/>
+          </a:bodyPr>
+          <a:lstStyle>
+            <a:lvl1pPr marL="0" indent="0" algn="ctr" defTabSz="914400" rtl="0" eaLnBrk="1" latinLnBrk="0" hangingPunct="1">
+              <a:spcBef>
+                <a:spcPct val="20000"/>
+              </a:spcBef>
+              <a:buFont typeface="Arial" pitchFamily="34" charset="0"/>
+              <a:buNone/>
+              <a:defRPr sz="3200" kern="1200">
+                <a:solidFill>
+                  <a:schemeClr val="tx1">
+                    <a:tint val="75000"/>
+                  </a:schemeClr>
+                </a:solidFill>
+                <a:latin typeface="+mn-lt"/>
+                <a:ea typeface="+mn-ea"/>
+                <a:cs typeface="+mn-cs"/>
+              </a:defRPr>
+            </a:lvl1pPr>
+            <a:lvl2pPr marL="457200" indent="0" algn="ctr" defTabSz="914400" rtl="0" eaLnBrk="1" latinLnBrk="0" hangingPunct="1">
+              <a:spcBef>
+                <a:spcPct val="20000"/>
+              </a:spcBef>
+              <a:buFont typeface="Arial" pitchFamily="34" charset="0"/>
+              <a:buNone/>
+              <a:defRPr sz="2800" kern="1200">
+                <a:solidFill>
+                  <a:schemeClr val="tx1">
+                    <a:tint val="75000"/>
+                  </a:schemeClr>
+                </a:solidFill>
+                <a:latin typeface="+mn-lt"/>
+                <a:ea typeface="+mn-ea"/>
+                <a:cs typeface="+mn-cs"/>
+              </a:defRPr>
+            </a:lvl2pPr>
+            <a:lvl3pPr marL="914400" indent="0" algn="ctr" defTabSz="914400" rtl="0" eaLnBrk="1" latinLnBrk="0" hangingPunct="1">
+              <a:spcBef>
+                <a:spcPct val="20000"/>
+              </a:spcBef>
+              <a:buFont typeface="Arial" pitchFamily="34" charset="0"/>
+              <a:buNone/>
+              <a:defRPr sz="2400" kern="1200">
+                <a:solidFill>
+                  <a:schemeClr val="tx1">
+                    <a:tint val="75000"/>
+                  </a:schemeClr>
+                </a:solidFill>
+                <a:latin typeface="+mn-lt"/>
+                <a:ea typeface="+mn-ea"/>
+                <a:cs typeface="+mn-cs"/>
+              </a:defRPr>
+            </a:lvl3pPr>
+            <a:lvl4pPr marL="1371600" indent="0" algn="ctr" defTabSz="914400" rtl="0" eaLnBrk="1" latinLnBrk="0" hangingPunct="1">
+              <a:spcBef>
+                <a:spcPct val="20000"/>
+              </a:spcBef>
+              <a:buFont typeface="Arial" pitchFamily="34" charset="0"/>
+              <a:buNone/>
+              <a:defRPr sz="2000" kern="1200">
+                <a:solidFill>
+                  <a:schemeClr val="tx1">
+                    <a:tint val="75000"/>
+                  </a:schemeClr>
+                </a:solidFill>
+                <a:latin typeface="+mn-lt"/>
+                <a:ea typeface="+mn-ea"/>
+                <a:cs typeface="+mn-cs"/>
+              </a:defRPr>
+            </a:lvl4pPr>
+            <a:lvl5pPr marL="1828800" indent="0" algn="ctr" defTabSz="914400" rtl="0" eaLnBrk="1" latinLnBrk="0" hangingPunct="1">
+              <a:spcBef>
+                <a:spcPct val="20000"/>
+              </a:spcBef>
+              <a:buFont typeface="Arial" pitchFamily="34" charset="0"/>
+              <a:buNone/>
+              <a:defRPr sz="2000" kern="1200">
+                <a:solidFill>
+                  <a:schemeClr val="tx1">
+                    <a:tint val="75000"/>
+                  </a:schemeClr>
+                </a:solidFill>
+                <a:latin typeface="+mn-lt"/>
+                <a:ea typeface="+mn-ea"/>
+                <a:cs typeface="+mn-cs"/>
+              </a:defRPr>
+            </a:lvl5pPr>
+            <a:lvl6pPr marL="2286000" indent="0" algn="ctr" defTabSz="914400" rtl="0" eaLnBrk="1" latinLnBrk="0" hangingPunct="1">
+              <a:spcBef>
+                <a:spcPct val="20000"/>
+              </a:spcBef>
+              <a:buFont typeface="Arial" pitchFamily="34" charset="0"/>
+              <a:buNone/>
+              <a:defRPr sz="2000" kern="1200">
+                <a:solidFill>
+                  <a:schemeClr val="tx1">
+                    <a:tint val="75000"/>
+                  </a:schemeClr>
+                </a:solidFill>
+                <a:latin typeface="+mn-lt"/>
+                <a:ea typeface="+mn-ea"/>
+                <a:cs typeface="+mn-cs"/>
+              </a:defRPr>
+            </a:lvl6pPr>
+            <a:lvl7pPr marL="2743200" indent="0" algn="ctr" defTabSz="914400" rtl="0" eaLnBrk="1" latinLnBrk="0" hangingPunct="1">
+              <a:spcBef>
+                <a:spcPct val="20000"/>
+              </a:spcBef>
+              <a:buFont typeface="Arial" pitchFamily="34" charset="0"/>
+              <a:buNone/>
+              <a:defRPr sz="2000" kern="1200">
+                <a:solidFill>
+                  <a:schemeClr val="tx1">
+                    <a:tint val="75000"/>
+                  </a:schemeClr>
+                </a:solidFill>
+                <a:latin typeface="+mn-lt"/>
+                <a:ea typeface="+mn-ea"/>
+                <a:cs typeface="+mn-cs"/>
+              </a:defRPr>
+            </a:lvl7pPr>
+            <a:lvl8pPr marL="3200400" indent="0" algn="ctr" defTabSz="914400" rtl="0" eaLnBrk="1" latinLnBrk="0" hangingPunct="1">
+              <a:spcBef>
+                <a:spcPct val="20000"/>
+              </a:spcBef>
+              <a:buFont typeface="Arial" pitchFamily="34" charset="0"/>
+              <a:buNone/>
+              <a:defRPr sz="2000" kern="1200">
+                <a:solidFill>
+                  <a:schemeClr val="tx1">
+                    <a:tint val="75000"/>
+                  </a:schemeClr>
+                </a:solidFill>
+                <a:latin typeface="+mn-lt"/>
+                <a:ea typeface="+mn-ea"/>
+                <a:cs typeface="+mn-cs"/>
+              </a:defRPr>
+            </a:lvl8pPr>
+            <a:lvl9pPr marL="3657600" indent="0" algn="ctr" defTabSz="914400" rtl="0" eaLnBrk="1" latinLnBrk="0" hangingPunct="1">
+              <a:spcBef>
+                <a:spcPct val="20000"/>
+              </a:spcBef>
+              <a:buFont typeface="Arial" pitchFamily="34" charset="0"/>
+              <a:buNone/>
+              <a:defRPr sz="2000" kern="1200">
+                <a:solidFill>
+                  <a:schemeClr val="tx1">
+                    <a:tint val="75000"/>
+                  </a:schemeClr>
+                </a:solidFill>
+                <a:latin typeface="+mn-lt"/>
+                <a:ea typeface="+mn-ea"/>
+                <a:cs typeface="+mn-cs"/>
+              </a:defRPr>
+            </a:lvl9pPr>
+          </a:lstStyle>
+          <a:p>
+            <a:pPr marL="457200" indent="-457200" algn="l">
+              <a:buFont typeface="Arial" panose="020B0604020202020204" pitchFamily="34" charset="0"/>
+              <a:buChar char="•"/>
+            </a:pPr>
+            <a:r>
+              <a:rPr lang="fr-FR" sz="4400" dirty="0">
+                <a:ln w="18415" cmpd="sng">
+                  <a:solidFill>
+                    <a:srgbClr val="FFFFFF"/>
+                  </a:solidFill>
+                  <a:prstDash val="solid"/>
+                </a:ln>
+                <a:solidFill>
+                  <a:srgbClr val="FFFFFF"/>
+                </a:solidFill>
+                <a:effectLst>
+                  <a:outerShdw blurRad="63500" dir="3600000" algn="tl" rotWithShape="0">
+                    <a:srgbClr val="000000">
+                      <a:alpha val="70000"/>
+                    </a:srgbClr>
+                  </a:outerShdw>
+                </a:effectLst>
+              </a:rPr>
+              <a:t>Exemple de code sans pattern</a:t>
+            </a:r>
+          </a:p>
+          <a:p>
+            <a:pPr marL="457200" indent="-457200" algn="l">
+              <a:buFont typeface="Arial" panose="020B0604020202020204" pitchFamily="34" charset="0"/>
+              <a:buChar char="•"/>
+            </a:pPr>
+            <a:r>
+              <a:rPr lang="fr-FR" sz="4400" dirty="0">
+                <a:ln w="18415" cmpd="sng">
+                  <a:solidFill>
+                    <a:srgbClr val="FFFFFF"/>
+                  </a:solidFill>
+                  <a:prstDash val="solid"/>
+                </a:ln>
+                <a:solidFill>
+                  <a:srgbClr val="FFFFFF"/>
+                </a:solidFill>
+                <a:effectLst>
+                  <a:outerShdw blurRad="63500" dir="3600000" algn="tl" rotWithShape="0">
+                    <a:srgbClr val="000000">
+                      <a:alpha val="70000"/>
+                    </a:srgbClr>
+                  </a:outerShdw>
+                </a:effectLst>
+              </a:rPr>
+              <a:t>Réflexion</a:t>
+            </a:r>
+          </a:p>
+          <a:p>
+            <a:pPr marL="457200" indent="-457200" algn="l">
+              <a:buFont typeface="Arial" panose="020B0604020202020204" pitchFamily="34" charset="0"/>
+              <a:buChar char="•"/>
+            </a:pPr>
+            <a:r>
+              <a:rPr lang="fr-FR" sz="4400" dirty="0">
+                <a:ln w="18415" cmpd="sng">
+                  <a:solidFill>
+                    <a:srgbClr val="FFFFFF"/>
+                  </a:solidFill>
+                  <a:prstDash val="solid"/>
+                </a:ln>
+                <a:solidFill>
+                  <a:srgbClr val="FFFFFF"/>
+                </a:solidFill>
+                <a:effectLst>
+                  <a:outerShdw blurRad="63500" dir="3600000" algn="tl" rotWithShape="0">
+                    <a:srgbClr val="000000">
+                      <a:alpha val="70000"/>
+                    </a:srgbClr>
+                  </a:outerShdw>
+                </a:effectLst>
+              </a:rPr>
+              <a:t>Application d’un pattern</a:t>
+            </a:r>
+          </a:p>
+        </p:txBody>
+      </p:sp>
+    </p:spTree>
+    <p:extLst>
+      <p:ext uri="{BB962C8B-B14F-4D97-AF65-F5344CB8AC3E}">
+        <p14:creationId xmlns:p14="http://schemas.microsoft.com/office/powerpoint/2010/main" val="324846674"/>
+      </p:ext>
+    </p:extLst>
+  </p:cSld>
+  <p:clrMapOvr>
+    <a:masterClrMapping/>
+  </p:clrMapOvr>
+  <p:timing>
+    <p:tnLst>
+      <p:par>
+        <p:cTn id="1" dur="indefinite" restart="never" nodeType="tmRoot">
+          <p:childTnLst>
+            <p:seq concurrent="1" nextAc="seek">
+              <p:cTn id="2" dur="indefinite" nodeType="mainSeq">
+                <p:childTnLst>
+                  <p:par>
+                    <p:cTn id="3" fill="hold">
+                      <p:stCondLst>
+                        <p:cond delay="indefinite"/>
+                      </p:stCondLst>
+                      <p:childTnLst>
+                        <p:par>
+                          <p:cTn id="4" fill="hold">
+                            <p:stCondLst>
+                              <p:cond delay="0"/>
+                            </p:stCondLst>
+                            <p:childTnLst>
+                              <p:par>
+                                <p:cTn id="5" presetID="2" presetClass="entr" presetSubtype="4" fill="hold" nodeType="clickEffect">
+                                  <p:stCondLst>
+                                    <p:cond delay="0"/>
+                                  </p:stCondLst>
+                                  <p:childTnLst>
+                                    <p:set>
+                                      <p:cBhvr>
+                                        <p:cTn id="6" dur="1" fill="hold">
+                                          <p:stCondLst>
+                                            <p:cond delay="0"/>
+                                          </p:stCondLst>
+                                        </p:cTn>
+                                        <p:tgtEl>
+                                          <p:spTgt spid="11">
+                                            <p:txEl>
+                                              <p:pRg st="0" end="0"/>
+                                            </p:txEl>
+                                          </p:spTgt>
+                                        </p:tgtEl>
+                                        <p:attrNameLst>
+                                          <p:attrName>style.visibility</p:attrName>
+                                        </p:attrNameLst>
+                                      </p:cBhvr>
+                                      <p:to>
+                                        <p:strVal val="visible"/>
+                                      </p:to>
+                                    </p:set>
+                                    <p:anim calcmode="lin" valueType="num">
+                                      <p:cBhvr additive="base">
+                                        <p:cTn id="7" dur="500" fill="hold"/>
+                                        <p:tgtEl>
+                                          <p:spTgt spid="11">
+                                            <p:txEl>
+                                              <p:pRg st="0" end="0"/>
+                                            </p:txEl>
+                                          </p:spTgt>
+                                        </p:tgtEl>
+                                        <p:attrNameLst>
+                                          <p:attrName>ppt_x</p:attrName>
+                                        </p:attrNameLst>
+                                      </p:cBhvr>
+                                      <p:tavLst>
+                                        <p:tav tm="0">
+                                          <p:val>
+                                            <p:strVal val="#ppt_x"/>
+                                          </p:val>
+                                        </p:tav>
+                                        <p:tav tm="100000">
+                                          <p:val>
+                                            <p:strVal val="#ppt_x"/>
+                                          </p:val>
+                                        </p:tav>
+                                      </p:tavLst>
+                                    </p:anim>
+                                    <p:anim calcmode="lin" valueType="num">
+                                      <p:cBhvr additive="base">
+                                        <p:cTn id="8" dur="500" fill="hold"/>
+                                        <p:tgtEl>
+                                          <p:spTgt spid="11">
+                                            <p:txEl>
+                                              <p:pRg st="0" end="0"/>
+                                            </p:txEl>
+                                          </p:spTgt>
+                                        </p:tgtEl>
+                                        <p:attrNameLst>
+                                          <p:attrName>ppt_y</p:attrName>
+                                        </p:attrNameLst>
+                                      </p:cBhvr>
+                                      <p:tavLst>
+                                        <p:tav tm="0">
+                                          <p:val>
+                                            <p:strVal val="1+#ppt_h/2"/>
+                                          </p:val>
+                                        </p:tav>
+                                        <p:tav tm="100000">
+                                          <p:val>
+                                            <p:strVal val="#ppt_y"/>
+                                          </p:val>
+                                        </p:tav>
+                                      </p:tavLst>
+                                    </p:anim>
+                                  </p:childTnLst>
+                                </p:cTn>
+                              </p:par>
+                            </p:childTnLst>
+                          </p:cTn>
+                        </p:par>
+                      </p:childTnLst>
+                    </p:cTn>
+                  </p:par>
+                  <p:par>
+                    <p:cTn id="9" fill="hold">
+                      <p:stCondLst>
+                        <p:cond delay="indefinite"/>
+                      </p:stCondLst>
+                      <p:childTnLst>
+                        <p:par>
+                          <p:cTn id="10" fill="hold">
+                            <p:stCondLst>
+                              <p:cond delay="0"/>
+                            </p:stCondLst>
+                            <p:childTnLst>
+                              <p:par>
+                                <p:cTn id="11" presetID="2" presetClass="entr" presetSubtype="4" fill="hold" nodeType="clickEffect">
+                                  <p:stCondLst>
+                                    <p:cond delay="0"/>
+                                  </p:stCondLst>
+                                  <p:childTnLst>
+                                    <p:set>
+                                      <p:cBhvr>
+                                        <p:cTn id="12" dur="1" fill="hold">
+                                          <p:stCondLst>
+                                            <p:cond delay="0"/>
+                                          </p:stCondLst>
+                                        </p:cTn>
+                                        <p:tgtEl>
+                                          <p:spTgt spid="11">
+                                            <p:txEl>
+                                              <p:pRg st="1" end="1"/>
+                                            </p:txEl>
+                                          </p:spTgt>
+                                        </p:tgtEl>
+                                        <p:attrNameLst>
+                                          <p:attrName>style.visibility</p:attrName>
+                                        </p:attrNameLst>
+                                      </p:cBhvr>
+                                      <p:to>
+                                        <p:strVal val="visible"/>
+                                      </p:to>
+                                    </p:set>
+                                    <p:anim calcmode="lin" valueType="num">
+                                      <p:cBhvr additive="base">
+                                        <p:cTn id="13" dur="500" fill="hold"/>
+                                        <p:tgtEl>
+                                          <p:spTgt spid="11">
+                                            <p:txEl>
+                                              <p:pRg st="1" end="1"/>
+                                            </p:txEl>
+                                          </p:spTgt>
+                                        </p:tgtEl>
+                                        <p:attrNameLst>
+                                          <p:attrName>ppt_x</p:attrName>
+                                        </p:attrNameLst>
+                                      </p:cBhvr>
+                                      <p:tavLst>
+                                        <p:tav tm="0">
+                                          <p:val>
+                                            <p:strVal val="#ppt_x"/>
+                                          </p:val>
+                                        </p:tav>
+                                        <p:tav tm="100000">
+                                          <p:val>
+                                            <p:strVal val="#ppt_x"/>
+                                          </p:val>
+                                        </p:tav>
+                                      </p:tavLst>
+                                    </p:anim>
+                                    <p:anim calcmode="lin" valueType="num">
+                                      <p:cBhvr additive="base">
+                                        <p:cTn id="14" dur="500" fill="hold"/>
+                                        <p:tgtEl>
+                                          <p:spTgt spid="11">
+                                            <p:txEl>
+                                              <p:pRg st="1" end="1"/>
+                                            </p:txEl>
+                                          </p:spTgt>
+                                        </p:tgtEl>
+                                        <p:attrNameLst>
+                                          <p:attrName>ppt_y</p:attrName>
+                                        </p:attrNameLst>
+                                      </p:cBhvr>
+                                      <p:tavLst>
+                                        <p:tav tm="0">
+                                          <p:val>
+                                            <p:strVal val="1+#ppt_h/2"/>
+                                          </p:val>
+                                        </p:tav>
+                                        <p:tav tm="100000">
+                                          <p:val>
+                                            <p:strVal val="#ppt_y"/>
+                                          </p:val>
+                                        </p:tav>
+                                      </p:tavLst>
+                                    </p:anim>
+                                  </p:childTnLst>
+                                </p:cTn>
+                              </p:par>
+                            </p:childTnLst>
+                          </p:cTn>
+                        </p:par>
+                      </p:childTnLst>
+                    </p:cTn>
+                  </p:par>
+                  <p:par>
+                    <p:cTn id="15" fill="hold">
+                      <p:stCondLst>
+                        <p:cond delay="indefinite"/>
+                      </p:stCondLst>
+                      <p:childTnLst>
+                        <p:par>
+                          <p:cTn id="16" fill="hold">
+                            <p:stCondLst>
+                              <p:cond delay="0"/>
+                            </p:stCondLst>
+                            <p:childTnLst>
+                              <p:par>
+                                <p:cTn id="17" presetID="2" presetClass="entr" presetSubtype="4" fill="hold" nodeType="clickEffect">
+                                  <p:stCondLst>
+                                    <p:cond delay="0"/>
+                                  </p:stCondLst>
+                                  <p:childTnLst>
+                                    <p:set>
+                                      <p:cBhvr>
+                                        <p:cTn id="18" dur="1" fill="hold">
+                                          <p:stCondLst>
+                                            <p:cond delay="0"/>
+                                          </p:stCondLst>
+                                        </p:cTn>
+                                        <p:tgtEl>
+                                          <p:spTgt spid="11">
+                                            <p:txEl>
+                                              <p:pRg st="2" end="2"/>
+                                            </p:txEl>
+                                          </p:spTgt>
+                                        </p:tgtEl>
+                                        <p:attrNameLst>
+                                          <p:attrName>style.visibility</p:attrName>
+                                        </p:attrNameLst>
+                                      </p:cBhvr>
+                                      <p:to>
+                                        <p:strVal val="visible"/>
+                                      </p:to>
+                                    </p:set>
+                                    <p:anim calcmode="lin" valueType="num">
+                                      <p:cBhvr additive="base">
+                                        <p:cTn id="19" dur="500" fill="hold"/>
+                                        <p:tgtEl>
+                                          <p:spTgt spid="11">
+                                            <p:txEl>
+                                              <p:pRg st="2" end="2"/>
+                                            </p:txEl>
+                                          </p:spTgt>
+                                        </p:tgtEl>
+                                        <p:attrNameLst>
+                                          <p:attrName>ppt_x</p:attrName>
+                                        </p:attrNameLst>
+                                      </p:cBhvr>
+                                      <p:tavLst>
+                                        <p:tav tm="0">
+                                          <p:val>
+                                            <p:strVal val="#ppt_x"/>
+                                          </p:val>
+                                        </p:tav>
+                                        <p:tav tm="100000">
+                                          <p:val>
+                                            <p:strVal val="#ppt_x"/>
+                                          </p:val>
+                                        </p:tav>
+                                      </p:tavLst>
+                                    </p:anim>
+                                    <p:anim calcmode="lin" valueType="num">
+                                      <p:cBhvr additive="base">
+                                        <p:cTn id="20" dur="500" fill="hold"/>
+                                        <p:tgtEl>
+                                          <p:spTgt spid="11">
+                                            <p:txEl>
+                                              <p:pRg st="2" end="2"/>
+                                            </p:txEl>
+                                          </p:spTgt>
+                                        </p:tgtEl>
+                                        <p:attrNameLst>
+                                          <p:attrName>ppt_y</p:attrName>
+                                        </p:attrNameLst>
+                                      </p:cBhvr>
+                                      <p:tavLst>
+                                        <p:tav tm="0">
+                                          <p:val>
+                                            <p:strVal val="1+#ppt_h/2"/>
+                                          </p:val>
+                                        </p:tav>
+                                        <p:tav tm="100000">
+                                          <p:val>
+                                            <p:strVal val="#ppt_y"/>
+                                          </p:val>
+                                        </p:tav>
+                                      </p:tavLst>
+                                    </p:anim>
+                                  </p:childTnLst>
+                                </p:cTn>
+                              </p:par>
+                            </p:childTnLst>
+                          </p:cTn>
+                        </p:par>
+                      </p:childTnLst>
+                    </p:cTn>
+                  </p:par>
+                </p:childTnLst>
+              </p:cTn>
+              <p:prevCondLst>
+                <p:cond evt="onPrev" delay="0">
+                  <p:tgtEl>
+                    <p:sldTgt/>
+                  </p:tgtEl>
+                </p:cond>
+              </p:prevCondLst>
+              <p:nextCondLst>
+                <p:cond evt="onNext" delay="0">
+                  <p:tgtEl>
+                    <p:sldTgt/>
+                  </p:tgtEl>
+                </p:cond>
+              </p:nextCondLst>
+            </p:seq>
+          </p:childTnLst>
+        </p:cTn>
+      </p:par>
+    </p:tnLst>
+  </p:timing>
+</p:sld>
+</file>
+
+<file path=ppt/slides/slide13.xml><?xml version="1.0" encoding="utf-8"?>
+<p:sld xmlns:a="http://schemas.openxmlformats.org/drawingml/2006/main" xmlns:r="http://schemas.openxmlformats.org/officeDocument/2006/relationships" xmlns:p="http://schemas.openxmlformats.org/presentationml/2006/main">
+  <p:cSld>
+    <p:spTree>
+      <p:nvGrpSpPr>
+        <p:cNvPr id="1" name=""/>
+        <p:cNvGrpSpPr/>
+        <p:nvPr/>
+      </p:nvGrpSpPr>
+      <p:grpSpPr>
+        <a:xfrm>
+          <a:off x="0" y="0"/>
+          <a:ext cx="0" cy="0"/>
+          <a:chOff x="0" y="0"/>
+          <a:chExt cx="0" cy="0"/>
+        </a:xfrm>
+      </p:grpSpPr>
+      <p:sp>
+        <p:nvSpPr>
           <p:cNvPr id="10" name="Rectangle 9"/>
           <p:cNvSpPr/>
           <p:nvPr/>
@@ -7140,618 +8012,6 @@
 </p:sld>
 </file>
 
-<file path=ppt/slides/slide12.xml><?xml version="1.0" encoding="utf-8"?>
-<p:sld xmlns:a="http://schemas.openxmlformats.org/drawingml/2006/main" xmlns:r="http://schemas.openxmlformats.org/officeDocument/2006/relationships" xmlns:p="http://schemas.openxmlformats.org/presentationml/2006/main">
-  <p:cSld>
-    <p:spTree>
-      <p:nvGrpSpPr>
-        <p:cNvPr id="1" name=""/>
-        <p:cNvGrpSpPr/>
-        <p:nvPr/>
-      </p:nvGrpSpPr>
-      <p:grpSpPr>
-        <a:xfrm>
-          <a:off x="0" y="0"/>
-          <a:ext cx="0" cy="0"/>
-          <a:chOff x="0" y="0"/>
-          <a:chExt cx="0" cy="0"/>
-        </a:xfrm>
-      </p:grpSpPr>
-      <p:sp>
-        <p:nvSpPr>
-          <p:cNvPr id="2" name="Title 1"/>
-          <p:cNvSpPr>
-            <a:spLocks noGrp="1"/>
-          </p:cNvSpPr>
-          <p:nvPr>
-            <p:ph type="title"/>
-          </p:nvPr>
-        </p:nvSpPr>
-        <p:spPr/>
-        <p:txBody>
-          <a:bodyPr/>
-          <a:lstStyle/>
-          <a:p>
-            <a:r>
-              <a:rPr lang="en-US" dirty="0"/>
-              <a:t>Adapter</a:t>
-            </a:r>
-          </a:p>
-        </p:txBody>
-      </p:sp>
-      <p:sp>
-        <p:nvSpPr>
-          <p:cNvPr id="3" name="Content Placeholder 2"/>
-          <p:cNvSpPr>
-            <a:spLocks noGrp="1"/>
-          </p:cNvSpPr>
-          <p:nvPr>
-            <p:ph idx="1"/>
-          </p:nvPr>
-        </p:nvSpPr>
-        <p:spPr/>
-        <p:txBody>
-          <a:bodyPr/>
-          <a:lstStyle/>
-          <a:p>
-            <a:pPr marL="0" indent="0">
-              <a:buClr>
-                <a:schemeClr val="accent4">
-                  <a:lumMod val="50000"/>
-                </a:schemeClr>
-              </a:buClr>
-              <a:buNone/>
-            </a:pPr>
-            <a:r>
-              <a:rPr lang="en-US" dirty="0"/>
-              <a:t>Class:</a:t>
-            </a:r>
-          </a:p>
-          <a:p>
-            <a:pPr>
-              <a:buClr>
-                <a:schemeClr val="accent4">
-                  <a:lumMod val="50000"/>
-                </a:schemeClr>
-              </a:buClr>
-              <a:buFont typeface="Wingdings 2" panose="05020102010507070707" pitchFamily="18" charset="2"/>
-              <a:buChar char="Ë"/>
-            </a:pPr>
-            <a:r>
-              <a:rPr lang="en-US" dirty="0"/>
-              <a:t> </a:t>
-            </a:r>
-            <a:r>
-              <a:rPr lang="en-US" dirty="0" err="1"/>
-              <a:t>Possibilit</a:t>
-            </a:r>
-            <a:r>
-              <a:rPr lang="fr-FR" dirty="0"/>
-              <a:t>é</a:t>
-            </a:r>
-            <a:r>
-              <a:rPr lang="en-US" dirty="0"/>
-              <a:t> </a:t>
-            </a:r>
-            <a:r>
-              <a:rPr lang="en-US" dirty="0" err="1"/>
-              <a:t>d’override</a:t>
-            </a:r>
-            <a:r>
-              <a:rPr lang="en-US" dirty="0"/>
-              <a:t> </a:t>
-            </a:r>
-            <a:r>
-              <a:rPr lang="en-US" dirty="0" err="1"/>
-              <a:t>certaines</a:t>
-            </a:r>
-            <a:r>
-              <a:rPr lang="en-US" dirty="0"/>
-              <a:t> </a:t>
-            </a:r>
-            <a:r>
-              <a:rPr lang="en-US" dirty="0" err="1"/>
-              <a:t>fonctionnalit</a:t>
-            </a:r>
-            <a:r>
-              <a:rPr lang="fr-FR" dirty="0" err="1"/>
-              <a:t>és</a:t>
-            </a:r>
-            <a:r>
-              <a:rPr lang="en-US" dirty="0"/>
-              <a:t> de </a:t>
-            </a:r>
-            <a:r>
-              <a:rPr lang="en-US" dirty="0" err="1"/>
-              <a:t>l’adapt</a:t>
-            </a:r>
-            <a:r>
-              <a:rPr lang="fr-FR" dirty="0"/>
-              <a:t>é</a:t>
-            </a:r>
-          </a:p>
-          <a:p>
-            <a:pPr>
-              <a:buClr>
-                <a:schemeClr val="accent4">
-                  <a:lumMod val="50000"/>
-                </a:schemeClr>
-              </a:buClr>
-              <a:buFont typeface="Wingdings 2" panose="05020102010507070707" pitchFamily="18" charset="2"/>
-              <a:buChar char="Ë"/>
-            </a:pPr>
-            <a:r>
-              <a:rPr lang="en-US" dirty="0"/>
-              <a:t> Un </a:t>
-            </a:r>
-            <a:r>
-              <a:rPr lang="en-US" dirty="0" err="1"/>
-              <a:t>seul</a:t>
-            </a:r>
-            <a:r>
-              <a:rPr lang="en-US" dirty="0"/>
-              <a:t> objet, pas plus de </a:t>
-            </a:r>
-            <a:r>
-              <a:rPr lang="en-US" dirty="0" err="1"/>
-              <a:t>traver</a:t>
-            </a:r>
-            <a:r>
-              <a:rPr lang="fr-FR" dirty="0" err="1"/>
-              <a:t>sée</a:t>
-            </a:r>
-            <a:r>
-              <a:rPr lang="en-US" dirty="0"/>
-              <a:t> </a:t>
-            </a:r>
-            <a:r>
-              <a:rPr lang="fr-FR" dirty="0"/>
-              <a:t>de référence</a:t>
-            </a:r>
-            <a:r>
-              <a:rPr lang="en-US" dirty="0"/>
-              <a:t>s </a:t>
-            </a:r>
-            <a:r>
-              <a:rPr lang="fr-FR" dirty="0"/>
-              <a:t>pour atteindre l’adapté</a:t>
-            </a:r>
-          </a:p>
-          <a:p>
-            <a:pPr>
-              <a:buClr>
-                <a:srgbClr val="FF0000"/>
-              </a:buClr>
-              <a:buFont typeface="Wingdings 3" panose="05040102010807070707" pitchFamily="18" charset="2"/>
-              <a:buChar char="¬"/>
-            </a:pPr>
-            <a:r>
-              <a:rPr lang="fr-FR" dirty="0"/>
-              <a:t> Consacré</a:t>
-            </a:r>
-            <a:r>
-              <a:rPr lang="en-US" dirty="0"/>
-              <a:t> </a:t>
-            </a:r>
-            <a:r>
-              <a:rPr lang="fr-FR" dirty="0"/>
-              <a:t>à</a:t>
-            </a:r>
-            <a:r>
-              <a:rPr lang="en-US" dirty="0"/>
-              <a:t> </a:t>
-            </a:r>
-            <a:r>
-              <a:rPr lang="en-US" dirty="0" err="1"/>
-              <a:t>une</a:t>
-            </a:r>
-            <a:r>
-              <a:rPr lang="en-US" dirty="0"/>
-              <a:t> </a:t>
-            </a:r>
-            <a:r>
-              <a:rPr lang="en-US" dirty="0" err="1"/>
-              <a:t>seule</a:t>
-            </a:r>
-            <a:r>
-              <a:rPr lang="en-US" dirty="0"/>
-              <a:t> </a:t>
-            </a:r>
-            <a:r>
-              <a:rPr lang="en-US" dirty="0" err="1"/>
-              <a:t>classe</a:t>
-            </a:r>
-            <a:r>
-              <a:rPr lang="en-US" dirty="0"/>
-              <a:t> </a:t>
-            </a:r>
-            <a:r>
-              <a:rPr lang="en-US" dirty="0" err="1"/>
-              <a:t>concr</a:t>
-            </a:r>
-            <a:r>
-              <a:rPr lang="fr-FR" dirty="0" err="1"/>
-              <a:t>ète</a:t>
-            </a:r>
-            <a:endParaRPr lang="fr-FR" dirty="0"/>
-          </a:p>
-          <a:p>
-            <a:pPr marL="0" indent="0">
-              <a:buClr>
-                <a:schemeClr val="accent4">
-                  <a:lumMod val="50000"/>
-                </a:schemeClr>
-              </a:buClr>
-              <a:buNone/>
-            </a:pPr>
-            <a:r>
-              <a:rPr lang="fr-FR" dirty="0"/>
-              <a:t>Object :</a:t>
-            </a:r>
-          </a:p>
-          <a:p>
-            <a:pPr>
-              <a:buClr>
-                <a:schemeClr val="accent4">
-                  <a:lumMod val="50000"/>
-                </a:schemeClr>
-              </a:buClr>
-              <a:buFont typeface="Wingdings 2" panose="05020102010507070707" pitchFamily="18" charset="2"/>
-              <a:buChar char="Ë"/>
-            </a:pPr>
-            <a:r>
-              <a:rPr lang="fr-FR" dirty="0"/>
-              <a:t> Marche avec plusieurs classes </a:t>
-            </a:r>
-            <a:r>
-              <a:rPr lang="en-US" dirty="0"/>
-              <a:t>: </a:t>
-            </a:r>
-            <a:r>
-              <a:rPr lang="fr-FR" dirty="0" err="1"/>
-              <a:t>l’adap</a:t>
-            </a:r>
-            <a:r>
-              <a:rPr lang="en-US" dirty="0" err="1"/>
-              <a:t>té</a:t>
-            </a:r>
-            <a:r>
-              <a:rPr lang="en-US" dirty="0"/>
-              <a:t> et </a:t>
-            </a:r>
-            <a:r>
-              <a:rPr lang="en-US" dirty="0" err="1"/>
-              <a:t>ses</a:t>
-            </a:r>
-            <a:r>
-              <a:rPr lang="en-US" dirty="0"/>
-              <a:t> d</a:t>
-            </a:r>
-            <a:r>
-              <a:rPr lang="fr-FR" dirty="0" err="1"/>
-              <a:t>érivé</a:t>
-            </a:r>
-            <a:r>
-              <a:rPr lang="en-US" dirty="0"/>
-              <a:t>s</a:t>
-            </a:r>
-            <a:endParaRPr lang="fr-FR" dirty="0"/>
-          </a:p>
-          <a:p>
-            <a:pPr>
-              <a:buClr>
-                <a:srgbClr val="FF0000"/>
-              </a:buClr>
-              <a:buFont typeface="Wingdings 3" panose="05040102010807070707" pitchFamily="18" charset="2"/>
-              <a:buChar char="¬"/>
-            </a:pPr>
-            <a:r>
-              <a:rPr lang="fr-FR" dirty="0"/>
-              <a:t> Difficile d’</a:t>
-            </a:r>
-            <a:r>
-              <a:rPr lang="fr-FR" dirty="0" err="1"/>
-              <a:t>override</a:t>
-            </a:r>
-            <a:r>
-              <a:rPr lang="fr-FR" dirty="0"/>
-              <a:t> les </a:t>
-            </a:r>
-            <a:r>
-              <a:rPr lang="fr-FR" dirty="0" err="1"/>
-              <a:t>fonctionalités</a:t>
-            </a:r>
-            <a:r>
-              <a:rPr lang="en-US" dirty="0"/>
-              <a:t> de </a:t>
-            </a:r>
-            <a:r>
-              <a:rPr lang="en-US" dirty="0" err="1"/>
-              <a:t>l’adapt</a:t>
-            </a:r>
-            <a:r>
-              <a:rPr lang="fr-FR" dirty="0"/>
-              <a:t>é</a:t>
-            </a:r>
-            <a:endParaRPr lang="en-US" dirty="0"/>
-          </a:p>
-        </p:txBody>
-      </p:sp>
-    </p:spTree>
-    <p:extLst>
-      <p:ext uri="{BB962C8B-B14F-4D97-AF65-F5344CB8AC3E}">
-        <p14:creationId xmlns:p14="http://schemas.microsoft.com/office/powerpoint/2010/main" val="4074292991"/>
-      </p:ext>
-    </p:extLst>
-  </p:cSld>
-  <p:clrMapOvr>
-    <a:masterClrMapping/>
-  </p:clrMapOvr>
-</p:sld>
-</file>
-
-<file path=ppt/slides/slide13.xml><?xml version="1.0" encoding="utf-8"?>
-<p:sld xmlns:a="http://schemas.openxmlformats.org/drawingml/2006/main" xmlns:r="http://schemas.openxmlformats.org/officeDocument/2006/relationships" xmlns:p="http://schemas.openxmlformats.org/presentationml/2006/main">
-  <p:cSld>
-    <p:spTree>
-      <p:nvGrpSpPr>
-        <p:cNvPr id="1" name=""/>
-        <p:cNvGrpSpPr/>
-        <p:nvPr/>
-      </p:nvGrpSpPr>
-      <p:grpSpPr>
-        <a:xfrm>
-          <a:off x="0" y="0"/>
-          <a:ext cx="0" cy="0"/>
-          <a:chOff x="0" y="0"/>
-          <a:chExt cx="0" cy="0"/>
-        </a:xfrm>
-      </p:grpSpPr>
-      <p:sp>
-        <p:nvSpPr>
-          <p:cNvPr id="2" name="Title 1"/>
-          <p:cNvSpPr>
-            <a:spLocks noGrp="1"/>
-          </p:cNvSpPr>
-          <p:nvPr>
-            <p:ph type="title"/>
-          </p:nvPr>
-        </p:nvSpPr>
-        <p:spPr/>
-        <p:txBody>
-          <a:bodyPr>
-            <a:normAutofit/>
-          </a:bodyPr>
-          <a:lstStyle/>
-          <a:p>
-            <a:r>
-              <a:rPr lang="en-US" dirty="0"/>
-              <a:t>Visitor</a:t>
-            </a:r>
-          </a:p>
-        </p:txBody>
-      </p:sp>
-      <p:sp>
-        <p:nvSpPr>
-          <p:cNvPr id="3" name="Content Placeholder 2"/>
-          <p:cNvSpPr>
-            <a:spLocks noGrp="1"/>
-          </p:cNvSpPr>
-          <p:nvPr>
-            <p:ph idx="1"/>
-          </p:nvPr>
-        </p:nvSpPr>
-        <p:spPr/>
-        <p:txBody>
-          <a:bodyPr/>
-          <a:lstStyle/>
-          <a:p>
-            <a:pPr>
-              <a:buClr>
-                <a:schemeClr val="accent6">
-                  <a:lumMod val="75000"/>
-                </a:schemeClr>
-              </a:buClr>
-              <a:buFont typeface="Wingdings 2" panose="05020102010507070707" pitchFamily="18" charset="2"/>
-              <a:buChar char=""/>
-            </a:pPr>
-            <a:r>
-              <a:rPr lang="en-US" dirty="0"/>
-              <a:t> Facile </a:t>
-            </a:r>
-            <a:r>
-              <a:rPr lang="en-US" dirty="0" err="1"/>
-              <a:t>d’ajouter</a:t>
-            </a:r>
-            <a:r>
-              <a:rPr lang="en-US" dirty="0"/>
-              <a:t> des </a:t>
-            </a:r>
-            <a:r>
-              <a:rPr lang="en-US" dirty="0" err="1"/>
-              <a:t>nouvelles</a:t>
-            </a:r>
-            <a:r>
-              <a:rPr lang="en-US" dirty="0"/>
-              <a:t> op</a:t>
-            </a:r>
-            <a:r>
-              <a:rPr lang="fr-FR" dirty="0" err="1"/>
-              <a:t>érations</a:t>
-            </a:r>
-            <a:endParaRPr lang="fr-FR" dirty="0"/>
-          </a:p>
-          <a:p>
-            <a:pPr>
-              <a:buClr>
-                <a:schemeClr val="accent6">
-                  <a:lumMod val="75000"/>
-                </a:schemeClr>
-              </a:buClr>
-              <a:buFont typeface="Wingdings 2" panose="05020102010507070707" pitchFamily="18" charset="2"/>
-              <a:buChar char=""/>
-            </a:pPr>
-            <a:r>
-              <a:rPr lang="fr-FR" dirty="0"/>
-              <a:t> Garde les classes d’objets un peu plus « propres » du point de vue des responsabilités</a:t>
-            </a:r>
-          </a:p>
-          <a:p>
-            <a:pPr>
-              <a:buFont typeface="Wingdings 2" panose="05020102010507070707" pitchFamily="18" charset="2"/>
-              <a:buChar char=""/>
-            </a:pPr>
-            <a:endParaRPr lang="en-US" dirty="0"/>
-          </a:p>
-          <a:p>
-            <a:pPr>
-              <a:buClr>
-                <a:srgbClr val="FF0000"/>
-              </a:buClr>
-              <a:buFont typeface="Wingdings 3" panose="05040102010807070707" pitchFamily="18" charset="2"/>
-              <a:buChar char="¬"/>
-            </a:pPr>
-            <a:r>
-              <a:rPr lang="en-US" dirty="0"/>
-              <a:t> </a:t>
-            </a:r>
-            <a:r>
-              <a:rPr lang="fr-FR" dirty="0"/>
-              <a:t>« </a:t>
-            </a:r>
-            <a:r>
-              <a:rPr lang="en-US" dirty="0"/>
-              <a:t>Difficile</a:t>
-            </a:r>
-            <a:r>
-              <a:rPr lang="fr-FR" dirty="0"/>
-              <a:t> » d</a:t>
-            </a:r>
-            <a:r>
-              <a:rPr lang="en-US" dirty="0"/>
-              <a:t>’</a:t>
-            </a:r>
-            <a:r>
-              <a:rPr lang="en-US" dirty="0" err="1"/>
-              <a:t>ajouter</a:t>
-            </a:r>
-            <a:r>
-              <a:rPr lang="en-US" dirty="0"/>
-              <a:t> des nouveaux </a:t>
-            </a:r>
-            <a:r>
-              <a:rPr lang="en-US" dirty="0" err="1"/>
-              <a:t>objets</a:t>
-            </a:r>
-            <a:endParaRPr lang="en-US" dirty="0"/>
-          </a:p>
-          <a:p>
-            <a:pPr>
-              <a:buClr>
-                <a:srgbClr val="FF0000"/>
-              </a:buClr>
-              <a:buFont typeface="Wingdings 3" panose="05040102010807070707" pitchFamily="18" charset="2"/>
-              <a:buChar char="¬"/>
-            </a:pPr>
-            <a:r>
-              <a:rPr lang="en-US" dirty="0" err="1"/>
-              <a:t>Besoin</a:t>
-            </a:r>
-            <a:r>
-              <a:rPr lang="en-US" dirty="0"/>
-              <a:t> </a:t>
-            </a:r>
-            <a:r>
-              <a:rPr lang="en-US" dirty="0" err="1"/>
-              <a:t>d’acc</a:t>
-            </a:r>
-            <a:r>
-              <a:rPr lang="fr-FR" dirty="0"/>
-              <a:t>ès</a:t>
-            </a:r>
-            <a:r>
-              <a:rPr lang="en-US" dirty="0"/>
-              <a:t> </a:t>
-            </a:r>
-            <a:r>
-              <a:rPr lang="fr-FR" dirty="0"/>
-              <a:t>à</a:t>
-            </a:r>
-            <a:r>
-              <a:rPr lang="en-US" dirty="0"/>
-              <a:t> des </a:t>
-            </a:r>
-            <a:r>
-              <a:rPr lang="en-US" dirty="0" err="1"/>
-              <a:t>donn</a:t>
-            </a:r>
-            <a:r>
-              <a:rPr lang="fr-FR" dirty="0" err="1"/>
-              <a:t>ées</a:t>
-            </a:r>
-            <a:r>
-              <a:rPr lang="en-US" dirty="0"/>
-              <a:t> </a:t>
-            </a:r>
-            <a:r>
-              <a:rPr lang="en-US" dirty="0" err="1"/>
-              <a:t>parfois</a:t>
-            </a:r>
-            <a:r>
-              <a:rPr lang="en-US" dirty="0"/>
-              <a:t> </a:t>
-            </a:r>
-            <a:r>
-              <a:rPr lang="en-US" dirty="0" err="1"/>
-              <a:t>cens</a:t>
-            </a:r>
-            <a:r>
-              <a:rPr lang="fr-FR" dirty="0" err="1"/>
-              <a:t>ée</a:t>
-            </a:r>
-            <a:r>
-              <a:rPr lang="en-US" dirty="0"/>
-              <a:t>s </a:t>
-            </a:r>
-            <a:r>
-              <a:rPr lang="fr-FR" dirty="0"/>
-              <a:t>être</a:t>
-            </a:r>
-            <a:r>
-              <a:rPr lang="en-US" dirty="0"/>
-              <a:t> </a:t>
-            </a:r>
-            <a:r>
-              <a:rPr lang="en-US" dirty="0" err="1"/>
-              <a:t>priv</a:t>
-            </a:r>
-            <a:r>
-              <a:rPr lang="fr-FR" dirty="0" err="1"/>
-              <a:t>ée</a:t>
-            </a:r>
-            <a:r>
-              <a:rPr lang="en-US" dirty="0"/>
-              <a:t>s</a:t>
-            </a:r>
-          </a:p>
-          <a:p>
-            <a:endParaRPr lang="en-US" dirty="0"/>
-          </a:p>
-        </p:txBody>
-      </p:sp>
-    </p:spTree>
-    <p:extLst>
-      <p:ext uri="{BB962C8B-B14F-4D97-AF65-F5344CB8AC3E}">
-        <p14:creationId xmlns:p14="http://schemas.microsoft.com/office/powerpoint/2010/main" val="1153597227"/>
-      </p:ext>
-    </p:extLst>
-  </p:cSld>
-  <p:clrMapOvr>
-    <a:masterClrMapping/>
-  </p:clrMapOvr>
-</p:sld>
-</file>
-
 <file path=ppt/slides/slide14.xml><?xml version="1.0" encoding="utf-8"?>
 <p:sld xmlns:a="http://schemas.openxmlformats.org/drawingml/2006/main" xmlns:r="http://schemas.openxmlformats.org/officeDocument/2006/relationships" xmlns:p="http://schemas.openxmlformats.org/presentationml/2006/main">
   <p:cSld>
@@ -7786,7 +8046,7 @@
           <a:p>
             <a:r>
               <a:rPr lang="en-US" dirty="0"/>
-              <a:t>Builder</a:t>
+              <a:t>Adapter</a:t>
             </a:r>
           </a:p>
         </p:txBody>
@@ -7806,9 +8066,23 @@
           <a:bodyPr/>
           <a:lstStyle/>
           <a:p>
+            <a:pPr marL="0" indent="0">
+              <a:buClr>
+                <a:schemeClr val="accent4">
+                  <a:lumMod val="50000"/>
+                </a:schemeClr>
+              </a:buClr>
+              <a:buNone/>
+            </a:pPr>
+            <a:r>
+              <a:rPr lang="en-US" dirty="0"/>
+              <a:t>Class:</a:t>
+            </a:r>
+          </a:p>
+          <a:p>
             <a:pPr>
               <a:buClr>
-                <a:schemeClr val="accent5">
+                <a:schemeClr val="accent4">
                   <a:lumMod val="50000"/>
                 </a:schemeClr>
               </a:buClr>
@@ -7821,19 +8095,39 @@
             </a:r>
             <a:r>
               <a:rPr lang="en-US" dirty="0" err="1"/>
-              <a:t>Évoluer</a:t>
+              <a:t>Possibilit</a:t>
+            </a:r>
+            <a:r>
+              <a:rPr lang="fr-FR" dirty="0"/>
+              <a:t>é</a:t>
             </a:r>
             <a:r>
               <a:rPr lang="en-US" dirty="0"/>
-              <a:t> la </a:t>
+              <a:t> </a:t>
             </a:r>
             <a:r>
               <a:rPr lang="en-US" dirty="0" err="1"/>
-              <a:t>mani</a:t>
-            </a:r>
-            <a:r>
-              <a:rPr lang="fr-FR" dirty="0"/>
-              <a:t>ère</a:t>
+              <a:t>d’override</a:t>
+            </a:r>
+            <a:r>
+              <a:rPr lang="en-US" dirty="0"/>
+              <a:t> </a:t>
+            </a:r>
+            <a:r>
+              <a:rPr lang="en-US" dirty="0" err="1"/>
+              <a:t>certaines</a:t>
+            </a:r>
+            <a:r>
+              <a:rPr lang="en-US" dirty="0"/>
+              <a:t> </a:t>
+            </a:r>
+            <a:r>
+              <a:rPr lang="en-US" dirty="0" err="1"/>
+              <a:t>fonctionnalit</a:t>
+            </a:r>
+            <a:r>
+              <a:rPr lang="fr-FR" dirty="0" err="1"/>
+              <a:t>és</a:t>
             </a:r>
             <a:r>
               <a:rPr lang="en-US" dirty="0"/>
@@ -7841,62 +8135,17 @@
             </a:r>
             <a:r>
               <a:rPr lang="en-US" dirty="0" err="1"/>
-              <a:t>construire</a:t>
-            </a:r>
-            <a:r>
-              <a:rPr lang="en-US" dirty="0"/>
-              <a:t> un ensemble </a:t>
-            </a:r>
-            <a:r>
-              <a:rPr lang="en-US" dirty="0" err="1"/>
-              <a:t>d’objets</a:t>
-            </a:r>
-            <a:r>
-              <a:rPr lang="en-US" dirty="0"/>
-              <a:t> s</a:t>
+              <a:t>l’adapt</a:t>
             </a:r>
             <a:r>
               <a:rPr lang="fr-FR" dirty="0"/>
-              <a:t>éparé</a:t>
-            </a:r>
-            <a:r>
-              <a:rPr lang="en-US" dirty="0" err="1"/>
-              <a:t>ment</a:t>
-            </a:r>
-            <a:r>
-              <a:rPr lang="en-US" dirty="0"/>
-              <a:t> de la </a:t>
-            </a:r>
-            <a:r>
-              <a:rPr lang="en-US" dirty="0" err="1"/>
-              <a:t>repr</a:t>
-            </a:r>
-            <a:r>
-              <a:rPr lang="fr-FR" dirty="0" err="1"/>
-              <a:t>ésentation</a:t>
-            </a:r>
-            <a:r>
-              <a:rPr lang="en-US" dirty="0"/>
-              <a:t> interne de </a:t>
-            </a:r>
-            <a:r>
-              <a:rPr lang="en-US" dirty="0" err="1"/>
-              <a:t>ces</a:t>
-            </a:r>
-            <a:r>
-              <a:rPr lang="en-US" dirty="0"/>
-              <a:t> </a:t>
-            </a:r>
-            <a:r>
-              <a:rPr lang="en-US" dirty="0" err="1"/>
-              <a:t>objets</a:t>
-            </a:r>
-            <a:endParaRPr lang="en-US" dirty="0"/>
+              <a:t>é</a:t>
+            </a:r>
           </a:p>
           <a:p>
             <a:pPr>
               <a:buClr>
-                <a:schemeClr val="accent5">
+                <a:schemeClr val="accent4">
                   <a:lumMod val="50000"/>
                 </a:schemeClr>
               </a:buClr>
@@ -7905,57 +8154,40 @@
             </a:pPr>
             <a:r>
               <a:rPr lang="en-US" dirty="0"/>
-              <a:t> Plus de </a:t>
+              <a:t> Un </a:t>
             </a:r>
             <a:r>
               <a:rPr lang="en-US" dirty="0" err="1"/>
-              <a:t>contr</a:t>
+              <a:t>seul</a:t>
+            </a:r>
+            <a:r>
+              <a:rPr lang="en-US" dirty="0"/>
+              <a:t> objet, pas plus de </a:t>
+            </a:r>
+            <a:r>
+              <a:rPr lang="en-US" dirty="0" err="1"/>
+              <a:t>traver</a:t>
             </a:r>
             <a:r>
               <a:rPr lang="fr-FR" dirty="0" err="1"/>
-              <a:t>ôl</a:t>
+              <a:t>sée</a:t>
             </a:r>
             <a:r>
               <a:rPr lang="en-US" dirty="0"/>
-              <a:t>e sur le </a:t>
-            </a:r>
-            <a:r>
-              <a:rPr lang="en-US" dirty="0" err="1"/>
-              <a:t>processus</a:t>
+              <a:t> </a:t>
+            </a:r>
+            <a:r>
+              <a:rPr lang="fr-FR" dirty="0"/>
+              <a:t>de référence</a:t>
             </a:r>
             <a:r>
               <a:rPr lang="en-US" dirty="0"/>
-              <a:t> de </a:t>
-            </a:r>
-            <a:r>
-              <a:rPr lang="en-US" dirty="0" err="1"/>
-              <a:t>cr</a:t>
-            </a:r>
-            <a:r>
-              <a:rPr lang="fr-FR" dirty="0" err="1"/>
-              <a:t>éation</a:t>
-            </a:r>
-            <a:r>
-              <a:rPr lang="en-US" dirty="0"/>
-              <a:t> au travers de </a:t>
-            </a:r>
-            <a:r>
-              <a:rPr lang="en-US" dirty="0" err="1"/>
-              <a:t>l’interface</a:t>
-            </a:r>
-            <a:endParaRPr lang="en-US" dirty="0"/>
-          </a:p>
-          <a:p>
-            <a:pPr>
-              <a:buClr>
-                <a:schemeClr val="accent5">
-                  <a:lumMod val="50000"/>
-                </a:schemeClr>
-              </a:buClr>
-              <a:buFont typeface="Wingdings 2" panose="05020102010507070707" pitchFamily="18" charset="2"/>
-              <a:buChar char="Ë"/>
-            </a:pPr>
-            <a:endParaRPr lang="en-US" dirty="0"/>
+              <a:t>s </a:t>
+            </a:r>
+            <a:r>
+              <a:rPr lang="fr-FR" dirty="0"/>
+              <a:t>pour atteindre l’adapté</a:t>
+            </a:r>
           </a:p>
           <a:p>
             <a:pPr>
@@ -7966,36 +8198,24 @@
               <a:buChar char="¬"/>
             </a:pPr>
             <a:r>
-              <a:rPr lang="en-US" dirty="0"/>
-              <a:t> Construction par </a:t>
-            </a:r>
-            <a:r>
               <a:rPr lang="fr-FR" dirty="0"/>
-              <a:t>étape</a:t>
-            </a:r>
-            <a:r>
-              <a:rPr lang="en-US" dirty="0"/>
-              <a:t> : </a:t>
-            </a:r>
-            <a:r>
-              <a:rPr lang="en-US" dirty="0" err="1"/>
-              <a:t>l’interface</a:t>
+              <a:t> Consacré</a:t>
             </a:r>
             <a:r>
               <a:rPr lang="en-US" dirty="0"/>
               <a:t> </a:t>
             </a:r>
             <a:r>
-              <a:rPr lang="en-US" dirty="0" err="1"/>
-              <a:t>doit</a:t>
+              <a:rPr lang="fr-FR" dirty="0"/>
+              <a:t>à</a:t>
             </a:r>
             <a:r>
               <a:rPr lang="en-US" dirty="0"/>
               <a:t> </a:t>
             </a:r>
             <a:r>
-              <a:rPr lang="fr-FR" dirty="0"/>
-              <a:t>être</a:t>
+              <a:rPr lang="en-US" dirty="0" err="1"/>
+              <a:t>une</a:t>
             </a:r>
             <a:r>
               <a:rPr lang="en-US" dirty="0"/>
@@ -8003,15 +8223,127 @@
             </a:r>
             <a:r>
               <a:rPr lang="en-US" dirty="0" err="1"/>
-              <a:t>suffisamment</a:t>
+              <a:t>seule</a:t>
             </a:r>
             <a:r>
               <a:rPr lang="en-US" dirty="0"/>
-              <a:t> g</a:t>
+              <a:t> </a:t>
+            </a:r>
+            <a:r>
+              <a:rPr lang="en-US" dirty="0" err="1"/>
+              <a:t>classe</a:t>
+            </a:r>
+            <a:r>
+              <a:rPr lang="en-US" dirty="0"/>
+              <a:t> </a:t>
+            </a:r>
+            <a:r>
+              <a:rPr lang="en-US" dirty="0" err="1"/>
+              <a:t>concr</a:t>
             </a:r>
             <a:r>
               <a:rPr lang="fr-FR" dirty="0" err="1"/>
-              <a:t>énérique</a:t>
+              <a:t>ète</a:t>
+            </a:r>
+            <a:endParaRPr lang="fr-FR" dirty="0"/>
+          </a:p>
+          <a:p>
+            <a:pPr marL="0" indent="0">
+              <a:buClr>
+                <a:schemeClr val="accent4">
+                  <a:lumMod val="50000"/>
+                </a:schemeClr>
+              </a:buClr>
+              <a:buNone/>
+            </a:pPr>
+            <a:r>
+              <a:rPr lang="fr-FR" dirty="0"/>
+              <a:t>Object :</a:t>
+            </a:r>
+          </a:p>
+          <a:p>
+            <a:pPr>
+              <a:buClr>
+                <a:schemeClr val="accent4">
+                  <a:lumMod val="50000"/>
+                </a:schemeClr>
+              </a:buClr>
+              <a:buFont typeface="Wingdings 2" panose="05020102010507070707" pitchFamily="18" charset="2"/>
+              <a:buChar char="Ë"/>
+            </a:pPr>
+            <a:r>
+              <a:rPr lang="fr-FR" dirty="0"/>
+              <a:t> Marche avec plusieurs classes </a:t>
+            </a:r>
+            <a:r>
+              <a:rPr lang="en-US" dirty="0"/>
+              <a:t>: </a:t>
+            </a:r>
+            <a:r>
+              <a:rPr lang="fr-FR" dirty="0" err="1"/>
+              <a:t>l’adap</a:t>
+            </a:r>
+            <a:r>
+              <a:rPr lang="en-US" dirty="0" err="1"/>
+              <a:t>té</a:t>
+            </a:r>
+            <a:r>
+              <a:rPr lang="en-US" dirty="0"/>
+              <a:t> et </a:t>
+            </a:r>
+            <a:r>
+              <a:rPr lang="en-US" dirty="0" err="1"/>
+              <a:t>ses</a:t>
+            </a:r>
+            <a:r>
+              <a:rPr lang="en-US" dirty="0"/>
+              <a:t> d</a:t>
+            </a:r>
+            <a:r>
+              <a:rPr lang="fr-FR" dirty="0" err="1"/>
+              <a:t>érivé</a:t>
+            </a:r>
+            <a:r>
+              <a:rPr lang="en-US" dirty="0"/>
+              <a:t>s</a:t>
+            </a:r>
+            <a:endParaRPr lang="fr-FR" dirty="0"/>
+          </a:p>
+          <a:p>
+            <a:pPr>
+              <a:buClr>
+                <a:srgbClr val="FF0000"/>
+              </a:buClr>
+              <a:buFont typeface="Wingdings 3" panose="05040102010807070707" pitchFamily="18" charset="2"/>
+              <a:buChar char="¬"/>
+            </a:pPr>
+            <a:r>
+              <a:rPr lang="fr-FR" dirty="0"/>
+              <a:t> Difficile d’</a:t>
+            </a:r>
+            <a:r>
+              <a:rPr lang="fr-FR" dirty="0" err="1"/>
+              <a:t>override</a:t>
+            </a:r>
+            <a:r>
+              <a:rPr lang="fr-FR" dirty="0"/>
+              <a:t> les </a:t>
+            </a:r>
+            <a:r>
+              <a:rPr lang="fr-FR" dirty="0" err="1"/>
+              <a:t>fonctionalités</a:t>
+            </a:r>
+            <a:r>
+              <a:rPr lang="en-US" dirty="0"/>
+              <a:t> de </a:t>
+            </a:r>
+            <a:r>
+              <a:rPr lang="en-US" dirty="0" err="1"/>
+              <a:t>l’adapt</a:t>
+            </a:r>
+            <a:r>
+              <a:rPr lang="fr-FR" dirty="0"/>
+              <a:t>é</a:t>
             </a:r>
             <a:endParaRPr lang="en-US" dirty="0"/>
           </a:p>
@@ -8020,7 +8352,7 @@
     </p:spTree>
     <p:extLst>
       <p:ext uri="{BB962C8B-B14F-4D97-AF65-F5344CB8AC3E}">
-        <p14:creationId xmlns:p14="http://schemas.microsoft.com/office/powerpoint/2010/main" val="1967577784"/>
+        <p14:creationId xmlns:p14="http://schemas.microsoft.com/office/powerpoint/2010/main" val="4074292991"/>
       </p:ext>
     </p:extLst>
   </p:cSld>
@@ -8059,12 +8391,14 @@
         </p:nvSpPr>
         <p:spPr/>
         <p:txBody>
-          <a:bodyPr/>
+          <a:bodyPr>
+            <a:normAutofit/>
+          </a:bodyPr>
           <a:lstStyle/>
           <a:p>
             <a:r>
               <a:rPr lang="en-US" dirty="0"/>
-              <a:t>Abstract Factory</a:t>
+              <a:t>Visitor</a:t>
             </a:r>
           </a:p>
         </p:txBody>
@@ -8086,129 +8420,59 @@
           <a:p>
             <a:pPr>
               <a:buClr>
-                <a:schemeClr val="accent5">
-                  <a:lumMod val="50000"/>
+                <a:schemeClr val="accent6">
+                  <a:lumMod val="75000"/>
                 </a:schemeClr>
               </a:buClr>
               <a:buFont typeface="Wingdings 2" panose="05020102010507070707" pitchFamily="18" charset="2"/>
-              <a:buChar char="Ë"/>
+              <a:buChar char=""/>
             </a:pPr>
             <a:r>
               <a:rPr lang="en-US" dirty="0"/>
-              <a:t> </a:t>
+              <a:t> Facile </a:t>
             </a:r>
             <a:r>
               <a:rPr lang="en-US" dirty="0" err="1"/>
-              <a:t>Isole</a:t>
+              <a:t>d’ajouter</a:t>
             </a:r>
             <a:r>
               <a:rPr lang="en-US" dirty="0"/>
-              <a:t> les classes </a:t>
+              <a:t> des </a:t>
             </a:r>
             <a:r>
               <a:rPr lang="en-US" dirty="0" err="1"/>
-              <a:t>concr</a:t>
+              <a:t>nouvelles</a:t>
+            </a:r>
+            <a:r>
+              <a:rPr lang="en-US" dirty="0"/>
+              <a:t> op</a:t>
             </a:r>
             <a:r>
               <a:rPr lang="fr-FR" dirty="0" err="1"/>
-              <a:t>ète</a:t>
-            </a:r>
-            <a:r>
-              <a:rPr lang="en-US" dirty="0"/>
-              <a:t>s, </a:t>
-            </a:r>
-            <a:r>
-              <a:rPr lang="en-US" dirty="0" err="1"/>
-              <a:t>encapsule</a:t>
-            </a:r>
-            <a:r>
-              <a:rPr lang="en-US" dirty="0"/>
-              <a:t> la </a:t>
-            </a:r>
-            <a:r>
-              <a:rPr lang="en-US" dirty="0" err="1"/>
-              <a:t>responsabilit</a:t>
-            </a:r>
-            <a:r>
-              <a:rPr lang="fr-FR" dirty="0"/>
-              <a:t>é</a:t>
-            </a:r>
-            <a:r>
-              <a:rPr lang="en-US" dirty="0"/>
-              <a:t> </a:t>
-            </a:r>
-            <a:r>
-              <a:rPr lang="en-US" dirty="0" err="1"/>
-              <a:t>d’instantiation</a:t>
-            </a:r>
-            <a:r>
-              <a:rPr lang="en-US" dirty="0"/>
-              <a:t>.</a:t>
-            </a:r>
+              <a:t>érations</a:t>
+            </a:r>
+            <a:endParaRPr lang="fr-FR" dirty="0"/>
           </a:p>
           <a:p>
             <a:pPr>
               <a:buClr>
-                <a:schemeClr val="accent5">
-                  <a:lumMod val="50000"/>
+                <a:schemeClr val="accent6">
+                  <a:lumMod val="75000"/>
                 </a:schemeClr>
               </a:buClr>
               <a:buFont typeface="Wingdings 2" panose="05020102010507070707" pitchFamily="18" charset="2"/>
-              <a:buChar char="Ë"/>
+              <a:buChar char=""/>
             </a:pPr>
             <a:r>
-              <a:rPr lang="en-US" dirty="0"/>
-              <a:t> </a:t>
-            </a:r>
-            <a:r>
-              <a:rPr lang="en-US" dirty="0" err="1"/>
-              <a:t>Facilit</a:t>
-            </a:r>
-            <a:r>
               <a:rPr lang="fr-FR" dirty="0"/>
-              <a:t>é de changer de famille de « produits ».</a:t>
+              <a:t> Garde les classes d’objets un peu plus « propres » du point de vue des responsabilités</a:t>
             </a:r>
           </a:p>
           <a:p>
             <a:pPr>
-              <a:buClr>
-                <a:schemeClr val="accent5">
-                  <a:lumMod val="50000"/>
-                </a:schemeClr>
-              </a:buClr>
               <a:buFont typeface="Wingdings 2" panose="05020102010507070707" pitchFamily="18" charset="2"/>
-              <a:buChar char="Ë"/>
+              <a:buChar char=""/>
             </a:pPr>
-            <a:r>
-              <a:rPr lang="en-US" dirty="0"/>
-              <a:t> </a:t>
-            </a:r>
-            <a:r>
-              <a:rPr lang="fr-FR" dirty="0"/>
-              <a:t>Permet un contrôle</a:t>
-            </a:r>
-            <a:r>
-              <a:rPr lang="en-US" dirty="0"/>
-              <a:t> sur la </a:t>
-            </a:r>
-            <a:r>
-              <a:rPr lang="en-US" dirty="0" err="1"/>
-              <a:t>coh</a:t>
-            </a:r>
-            <a:r>
-              <a:rPr lang="fr-FR" dirty="0" err="1"/>
-              <a:t>érence</a:t>
-            </a:r>
-            <a:r>
-              <a:rPr lang="en-US" dirty="0"/>
-              <a:t> des </a:t>
-            </a:r>
-            <a:r>
-              <a:rPr lang="fr-FR" dirty="0"/>
-              <a:t>« produits ».</a:t>
-            </a:r>
-          </a:p>
-          <a:p>
             <a:endParaRPr lang="en-US" dirty="0"/>
           </a:p>
           <a:p>
@@ -8220,29 +8484,38 @@
               <a:buChar char="¬"/>
             </a:pPr>
             <a:r>
-              <a:rPr lang="en-US" dirty="0" err="1"/>
-              <a:t>Ajouter</a:t>
-            </a:r>
-            <a:r>
-              <a:rPr lang="en-US" dirty="0"/>
-              <a:t> des nouveaux types de </a:t>
-            </a:r>
-            <a:r>
-              <a:rPr lang="fr-FR" dirty="0"/>
-              <a:t>« produit »</a:t>
-            </a:r>
-            <a:r>
               <a:rPr lang="en-US" dirty="0"/>
               <a:t> </a:t>
             </a:r>
             <a:r>
+              <a:rPr lang="fr-FR" dirty="0"/>
+              <a:t>« </a:t>
+            </a:r>
+            <a:r>
+              <a:rPr lang="en-US" dirty="0"/>
+              <a:t>Difficile</a:t>
+            </a:r>
+            <a:r>
+              <a:rPr lang="fr-FR" dirty="0"/>
+              <a:t> » d</a:t>
+            </a:r>
+            <a:r>
+              <a:rPr lang="en-US" dirty="0"/>
+              <a:t>’</a:t>
+            </a:r>
+            <a:r>
               <a:rPr lang="en-US" dirty="0" err="1"/>
-              <a:t>est</a:t>
+              <a:t>ajouter</a:t>
             </a:r>
             <a:r>
               <a:rPr lang="en-US" dirty="0"/>
-              <a:t> difficile.</a:t>
-            </a:r>
+              <a:t> des nouveaux </a:t>
+            </a:r>
+            <a:r>
+              <a:rPr lang="en-US" dirty="0" err="1"/>
+              <a:t>objets</a:t>
+            </a:r>
+            <a:endParaRPr lang="en-US" dirty="0"/>
           </a:p>
           <a:p>
             <a:pPr>
@@ -8252,14 +8525,96 @@
               <a:buFont typeface="Wingdings 3" panose="05040102010807070707" pitchFamily="18" charset="2"/>
               <a:buChar char="¬"/>
             </a:pPr>
-            <a:endParaRPr lang="fr-FR" dirty="0"/>
+            <a:r>
+              <a:rPr lang="en-US" dirty="0" err="1"/>
+              <a:t>Besoin</a:t>
+            </a:r>
+            <a:r>
+              <a:rPr lang="en-US" dirty="0"/>
+              <a:t> </a:t>
+            </a:r>
+            <a:r>
+              <a:rPr lang="en-US" dirty="0" err="1"/>
+              <a:t>d’acc</a:t>
+            </a:r>
+            <a:r>
+              <a:rPr lang="fr-FR" dirty="0"/>
+              <a:t>ès</a:t>
+            </a:r>
+            <a:r>
+              <a:rPr lang="en-US" dirty="0"/>
+              <a:t> </a:t>
+            </a:r>
+            <a:r>
+              <a:rPr lang="fr-FR" dirty="0"/>
+              <a:t>à</a:t>
+            </a:r>
+            <a:r>
+              <a:rPr lang="en-US" dirty="0"/>
+              <a:t> des </a:t>
+            </a:r>
+            <a:r>
+              <a:rPr lang="en-US" dirty="0" err="1"/>
+              <a:t>donn</a:t>
+            </a:r>
+            <a:r>
+              <a:rPr lang="fr-FR" dirty="0" err="1"/>
+              <a:t>ées</a:t>
+            </a:r>
+            <a:r>
+              <a:rPr lang="en-US" dirty="0"/>
+              <a:t> </a:t>
+            </a:r>
+            <a:r>
+              <a:rPr lang="en-US" dirty="0" err="1"/>
+              <a:t>parfois</a:t>
+            </a:r>
+            <a:r>
+              <a:rPr lang="en-US" dirty="0"/>
+              <a:t> </a:t>
+            </a:r>
+            <a:r>
+              <a:rPr lang="en-US" dirty="0" err="1"/>
+              <a:t>cens</a:t>
+            </a:r>
+            <a:r>
+              <a:rPr lang="fr-FR" dirty="0" err="1"/>
+              <a:t>ée</a:t>
+            </a:r>
+            <a:r>
+              <a:rPr lang="en-US" dirty="0"/>
+              <a:t>s </a:t>
+            </a:r>
+            <a:r>
+              <a:rPr lang="fr-FR" dirty="0"/>
+              <a:t>être</a:t>
+            </a:r>
+            <a:r>
+              <a:rPr lang="en-US" dirty="0"/>
+              <a:t> </a:t>
+            </a:r>
+            <a:r>
+              <a:rPr lang="en-US" dirty="0" err="1"/>
+              <a:t>priv</a:t>
+            </a:r>
+            <a:r>
+              <a:rPr lang="fr-FR" dirty="0" err="1"/>
+              <a:t>ée</a:t>
+            </a:r>
+            <a:r>
+              <a:rPr lang="en-US" dirty="0"/>
+              <a:t>s</a:t>
+            </a:r>
+          </a:p>
+          <a:p>
+            <a:endParaRPr lang="en-US" dirty="0"/>
           </a:p>
         </p:txBody>
       </p:sp>
     </p:spTree>
     <p:extLst>
       <p:ext uri="{BB962C8B-B14F-4D97-AF65-F5344CB8AC3E}">
-        <p14:creationId xmlns:p14="http://schemas.microsoft.com/office/powerpoint/2010/main" val="199355771"/>
+        <p14:creationId xmlns:p14="http://schemas.microsoft.com/office/powerpoint/2010/main" val="1153597227"/>
       </p:ext>
     </p:extLst>
   </p:cSld>
@@ -8298,14 +8653,12 @@
         </p:nvSpPr>
         <p:spPr/>
         <p:txBody>
-          <a:bodyPr>
-            <a:normAutofit/>
-          </a:bodyPr>
+          <a:bodyPr/>
           <a:lstStyle/>
           <a:p>
             <a:r>
               <a:rPr lang="en-US" dirty="0"/>
-              <a:t>Template Method</a:t>
+              <a:t>Builder</a:t>
             </a:r>
           </a:p>
         </p:txBody>
@@ -8340,6 +8693,525 @@
             </a:r>
             <a:r>
               <a:rPr lang="en-US" dirty="0" err="1"/>
+              <a:t>Évoluer</a:t>
+            </a:r>
+            <a:r>
+              <a:rPr lang="en-US" dirty="0"/>
+              <a:t> la </a:t>
+            </a:r>
+            <a:r>
+              <a:rPr lang="en-US" dirty="0" err="1"/>
+              <a:t>mani</a:t>
+            </a:r>
+            <a:r>
+              <a:rPr lang="fr-FR" dirty="0"/>
+              <a:t>ère</a:t>
+            </a:r>
+            <a:r>
+              <a:rPr lang="en-US" dirty="0"/>
+              <a:t> de </a:t>
+            </a:r>
+            <a:r>
+              <a:rPr lang="en-US" dirty="0" err="1"/>
+              <a:t>construire</a:t>
+            </a:r>
+            <a:r>
+              <a:rPr lang="en-US" dirty="0"/>
+              <a:t> un ensemble </a:t>
+            </a:r>
+            <a:r>
+              <a:rPr lang="en-US" dirty="0" err="1"/>
+              <a:t>d’objets</a:t>
+            </a:r>
+            <a:r>
+              <a:rPr lang="en-US" dirty="0"/>
+              <a:t> s</a:t>
+            </a:r>
+            <a:r>
+              <a:rPr lang="fr-FR" dirty="0"/>
+              <a:t>éparé</a:t>
+            </a:r>
+            <a:r>
+              <a:rPr lang="en-US" dirty="0" err="1"/>
+              <a:t>ment</a:t>
+            </a:r>
+            <a:r>
+              <a:rPr lang="en-US" dirty="0"/>
+              <a:t> de la </a:t>
+            </a:r>
+            <a:r>
+              <a:rPr lang="en-US" dirty="0" err="1"/>
+              <a:t>repr</a:t>
+            </a:r>
+            <a:r>
+              <a:rPr lang="fr-FR" dirty="0" err="1"/>
+              <a:t>ésentation</a:t>
+            </a:r>
+            <a:r>
+              <a:rPr lang="en-US" dirty="0"/>
+              <a:t> interne de </a:t>
+            </a:r>
+            <a:r>
+              <a:rPr lang="en-US" dirty="0" err="1"/>
+              <a:t>ces</a:t>
+            </a:r>
+            <a:r>
+              <a:rPr lang="en-US" dirty="0"/>
+              <a:t> </a:t>
+            </a:r>
+            <a:r>
+              <a:rPr lang="en-US" dirty="0" err="1"/>
+              <a:t>objets</a:t>
+            </a:r>
+            <a:endParaRPr lang="en-US" dirty="0"/>
+          </a:p>
+          <a:p>
+            <a:pPr>
+              <a:buClr>
+                <a:schemeClr val="accent5">
+                  <a:lumMod val="50000"/>
+                </a:schemeClr>
+              </a:buClr>
+              <a:buFont typeface="Wingdings 2" panose="05020102010507070707" pitchFamily="18" charset="2"/>
+              <a:buChar char="Ë"/>
+            </a:pPr>
+            <a:r>
+              <a:rPr lang="en-US" dirty="0"/>
+              <a:t> Plus de </a:t>
+            </a:r>
+            <a:r>
+              <a:rPr lang="en-US" dirty="0" err="1"/>
+              <a:t>contr</a:t>
+            </a:r>
+            <a:r>
+              <a:rPr lang="fr-FR" dirty="0" err="1"/>
+              <a:t>ôl</a:t>
+            </a:r>
+            <a:r>
+              <a:rPr lang="en-US" dirty="0"/>
+              <a:t>e sur le </a:t>
+            </a:r>
+            <a:r>
+              <a:rPr lang="en-US" dirty="0" err="1"/>
+              <a:t>processus</a:t>
+            </a:r>
+            <a:r>
+              <a:rPr lang="en-US" dirty="0"/>
+              <a:t> de </a:t>
+            </a:r>
+            <a:r>
+              <a:rPr lang="en-US" dirty="0" err="1"/>
+              <a:t>cr</a:t>
+            </a:r>
+            <a:r>
+              <a:rPr lang="fr-FR" dirty="0" err="1"/>
+              <a:t>éation</a:t>
+            </a:r>
+            <a:r>
+              <a:rPr lang="en-US" dirty="0"/>
+              <a:t> au travers de </a:t>
+            </a:r>
+            <a:r>
+              <a:rPr lang="en-US" dirty="0" err="1"/>
+              <a:t>l’interface</a:t>
+            </a:r>
+            <a:endParaRPr lang="en-US" dirty="0"/>
+          </a:p>
+          <a:p>
+            <a:pPr>
+              <a:buClr>
+                <a:schemeClr val="accent5">
+                  <a:lumMod val="50000"/>
+                </a:schemeClr>
+              </a:buClr>
+              <a:buFont typeface="Wingdings 2" panose="05020102010507070707" pitchFamily="18" charset="2"/>
+              <a:buChar char="Ë"/>
+            </a:pPr>
+            <a:endParaRPr lang="en-US" dirty="0"/>
+          </a:p>
+          <a:p>
+            <a:pPr>
+              <a:buClr>
+                <a:srgbClr val="FF0000"/>
+              </a:buClr>
+              <a:buFont typeface="Wingdings 3" panose="05040102010807070707" pitchFamily="18" charset="2"/>
+              <a:buChar char="¬"/>
+            </a:pPr>
+            <a:r>
+              <a:rPr lang="en-US" dirty="0"/>
+              <a:t> Construction par </a:t>
+            </a:r>
+            <a:r>
+              <a:rPr lang="fr-FR" dirty="0"/>
+              <a:t>étape</a:t>
+            </a:r>
+            <a:r>
+              <a:rPr lang="en-US" dirty="0"/>
+              <a:t> : </a:t>
+            </a:r>
+            <a:r>
+              <a:rPr lang="en-US" dirty="0" err="1"/>
+              <a:t>l’interface</a:t>
+            </a:r>
+            <a:r>
+              <a:rPr lang="en-US" dirty="0"/>
+              <a:t> </a:t>
+            </a:r>
+            <a:r>
+              <a:rPr lang="en-US" dirty="0" err="1"/>
+              <a:t>doit</a:t>
+            </a:r>
+            <a:r>
+              <a:rPr lang="en-US" dirty="0"/>
+              <a:t> </a:t>
+            </a:r>
+            <a:r>
+              <a:rPr lang="fr-FR" dirty="0"/>
+              <a:t>être</a:t>
+            </a:r>
+            <a:r>
+              <a:rPr lang="en-US" dirty="0"/>
+              <a:t> </a:t>
+            </a:r>
+            <a:r>
+              <a:rPr lang="en-US" dirty="0" err="1"/>
+              <a:t>suffisamment</a:t>
+            </a:r>
+            <a:r>
+              <a:rPr lang="en-US" dirty="0"/>
+              <a:t> g</a:t>
+            </a:r>
+            <a:r>
+              <a:rPr lang="fr-FR" dirty="0" err="1"/>
+              <a:t>énérique</a:t>
+            </a:r>
+            <a:endParaRPr lang="en-US" dirty="0"/>
+          </a:p>
+        </p:txBody>
+      </p:sp>
+    </p:spTree>
+    <p:extLst>
+      <p:ext uri="{BB962C8B-B14F-4D97-AF65-F5344CB8AC3E}">
+        <p14:creationId xmlns:p14="http://schemas.microsoft.com/office/powerpoint/2010/main" val="1967577784"/>
+      </p:ext>
+    </p:extLst>
+  </p:cSld>
+  <p:clrMapOvr>
+    <a:masterClrMapping/>
+  </p:clrMapOvr>
+</p:sld>
+</file>
+
+<file path=ppt/slides/slide17.xml><?xml version="1.0" encoding="utf-8"?>
+<p:sld xmlns:a="http://schemas.openxmlformats.org/drawingml/2006/main" xmlns:r="http://schemas.openxmlformats.org/officeDocument/2006/relationships" xmlns:p="http://schemas.openxmlformats.org/presentationml/2006/main">
+  <p:cSld>
+    <p:spTree>
+      <p:nvGrpSpPr>
+        <p:cNvPr id="1" name=""/>
+        <p:cNvGrpSpPr/>
+        <p:nvPr/>
+      </p:nvGrpSpPr>
+      <p:grpSpPr>
+        <a:xfrm>
+          <a:off x="0" y="0"/>
+          <a:ext cx="0" cy="0"/>
+          <a:chOff x="0" y="0"/>
+          <a:chExt cx="0" cy="0"/>
+        </a:xfrm>
+      </p:grpSpPr>
+      <p:sp>
+        <p:nvSpPr>
+          <p:cNvPr id="2" name="Title 1"/>
+          <p:cNvSpPr>
+            <a:spLocks noGrp="1"/>
+          </p:cNvSpPr>
+          <p:nvPr>
+            <p:ph type="title"/>
+          </p:nvPr>
+        </p:nvSpPr>
+        <p:spPr/>
+        <p:txBody>
+          <a:bodyPr/>
+          <a:lstStyle/>
+          <a:p>
+            <a:r>
+              <a:rPr lang="en-US" dirty="0"/>
+              <a:t>Abstract Factory</a:t>
+            </a:r>
+          </a:p>
+        </p:txBody>
+      </p:sp>
+      <p:sp>
+        <p:nvSpPr>
+          <p:cNvPr id="3" name="Content Placeholder 2"/>
+          <p:cNvSpPr>
+            <a:spLocks noGrp="1"/>
+          </p:cNvSpPr>
+          <p:nvPr>
+            <p:ph idx="1"/>
+          </p:nvPr>
+        </p:nvSpPr>
+        <p:spPr/>
+        <p:txBody>
+          <a:bodyPr/>
+          <a:lstStyle/>
+          <a:p>
+            <a:pPr>
+              <a:buClr>
+                <a:schemeClr val="accent5">
+                  <a:lumMod val="50000"/>
+                </a:schemeClr>
+              </a:buClr>
+              <a:buFont typeface="Wingdings 2" panose="05020102010507070707" pitchFamily="18" charset="2"/>
+              <a:buChar char="Ë"/>
+            </a:pPr>
+            <a:r>
+              <a:rPr lang="en-US" dirty="0"/>
+              <a:t> </a:t>
+            </a:r>
+            <a:r>
+              <a:rPr lang="en-US" dirty="0" err="1"/>
+              <a:t>Isole</a:t>
+            </a:r>
+            <a:r>
+              <a:rPr lang="en-US" dirty="0"/>
+              <a:t> les classes </a:t>
+            </a:r>
+            <a:r>
+              <a:rPr lang="en-US" dirty="0" err="1"/>
+              <a:t>concr</a:t>
+            </a:r>
+            <a:r>
+              <a:rPr lang="fr-FR" dirty="0" err="1"/>
+              <a:t>ète</a:t>
+            </a:r>
+            <a:r>
+              <a:rPr lang="en-US" dirty="0"/>
+              <a:t>s, </a:t>
+            </a:r>
+            <a:r>
+              <a:rPr lang="en-US" dirty="0" err="1"/>
+              <a:t>encapsule</a:t>
+            </a:r>
+            <a:r>
+              <a:rPr lang="en-US" dirty="0"/>
+              <a:t> la </a:t>
+            </a:r>
+            <a:r>
+              <a:rPr lang="en-US" dirty="0" err="1"/>
+              <a:t>responsabilit</a:t>
+            </a:r>
+            <a:r>
+              <a:rPr lang="fr-FR" dirty="0"/>
+              <a:t>é</a:t>
+            </a:r>
+            <a:r>
+              <a:rPr lang="en-US" dirty="0"/>
+              <a:t> </a:t>
+            </a:r>
+            <a:r>
+              <a:rPr lang="en-US" dirty="0" err="1"/>
+              <a:t>d’instantiation</a:t>
+            </a:r>
+            <a:r>
+              <a:rPr lang="en-US" dirty="0"/>
+              <a:t>.</a:t>
+            </a:r>
+          </a:p>
+          <a:p>
+            <a:pPr>
+              <a:buClr>
+                <a:schemeClr val="accent5">
+                  <a:lumMod val="50000"/>
+                </a:schemeClr>
+              </a:buClr>
+              <a:buFont typeface="Wingdings 2" panose="05020102010507070707" pitchFamily="18" charset="2"/>
+              <a:buChar char="Ë"/>
+            </a:pPr>
+            <a:r>
+              <a:rPr lang="en-US" dirty="0"/>
+              <a:t> </a:t>
+            </a:r>
+            <a:r>
+              <a:rPr lang="en-US" dirty="0" err="1"/>
+              <a:t>Facilit</a:t>
+            </a:r>
+            <a:r>
+              <a:rPr lang="fr-FR" dirty="0"/>
+              <a:t>é de changer de famille de « produits ».</a:t>
+            </a:r>
+          </a:p>
+          <a:p>
+            <a:pPr>
+              <a:buClr>
+                <a:schemeClr val="accent5">
+                  <a:lumMod val="50000"/>
+                </a:schemeClr>
+              </a:buClr>
+              <a:buFont typeface="Wingdings 2" panose="05020102010507070707" pitchFamily="18" charset="2"/>
+              <a:buChar char="Ë"/>
+            </a:pPr>
+            <a:r>
+              <a:rPr lang="en-US" dirty="0"/>
+              <a:t> </a:t>
+            </a:r>
+            <a:r>
+              <a:rPr lang="fr-FR" dirty="0"/>
+              <a:t>Permet un contrôle</a:t>
+            </a:r>
+            <a:r>
+              <a:rPr lang="en-US" dirty="0"/>
+              <a:t> sur la </a:t>
+            </a:r>
+            <a:r>
+              <a:rPr lang="en-US" dirty="0" err="1"/>
+              <a:t>coh</a:t>
+            </a:r>
+            <a:r>
+              <a:rPr lang="fr-FR" dirty="0" err="1"/>
+              <a:t>érence</a:t>
+            </a:r>
+            <a:r>
+              <a:rPr lang="en-US" dirty="0"/>
+              <a:t> des </a:t>
+            </a:r>
+            <a:r>
+              <a:rPr lang="fr-FR" dirty="0"/>
+              <a:t>« produits ».</a:t>
+            </a:r>
+          </a:p>
+          <a:p>
+            <a:endParaRPr lang="en-US" dirty="0"/>
+          </a:p>
+          <a:p>
+            <a:pPr>
+              <a:buClr>
+                <a:srgbClr val="FF0000"/>
+              </a:buClr>
+              <a:buFont typeface="Wingdings 3" panose="05040102010807070707" pitchFamily="18" charset="2"/>
+              <a:buChar char="¬"/>
+            </a:pPr>
+            <a:r>
+              <a:rPr lang="en-US" dirty="0" err="1"/>
+              <a:t>Ajouter</a:t>
+            </a:r>
+            <a:r>
+              <a:rPr lang="en-US" dirty="0"/>
+              <a:t> des nouveaux types de </a:t>
+            </a:r>
+            <a:r>
+              <a:rPr lang="fr-FR" dirty="0"/>
+              <a:t>« produit »</a:t>
+            </a:r>
+            <a:r>
+              <a:rPr lang="en-US" dirty="0"/>
+              <a:t> </a:t>
+            </a:r>
+            <a:r>
+              <a:rPr lang="en-US" dirty="0" err="1"/>
+              <a:t>est</a:t>
+            </a:r>
+            <a:r>
+              <a:rPr lang="en-US" dirty="0"/>
+              <a:t> difficile.</a:t>
+            </a:r>
+          </a:p>
+          <a:p>
+            <a:pPr>
+              <a:buClr>
+                <a:srgbClr val="FF0000"/>
+              </a:buClr>
+              <a:buFont typeface="Wingdings 3" panose="05040102010807070707" pitchFamily="18" charset="2"/>
+              <a:buChar char="¬"/>
+            </a:pPr>
+            <a:endParaRPr lang="fr-FR" dirty="0"/>
+          </a:p>
+        </p:txBody>
+      </p:sp>
+    </p:spTree>
+    <p:extLst>
+      <p:ext uri="{BB962C8B-B14F-4D97-AF65-F5344CB8AC3E}">
+        <p14:creationId xmlns:p14="http://schemas.microsoft.com/office/powerpoint/2010/main" val="199355771"/>
+      </p:ext>
+    </p:extLst>
+  </p:cSld>
+  <p:clrMapOvr>
+    <a:masterClrMapping/>
+  </p:clrMapOvr>
+</p:sld>
+</file>
+
+<file path=ppt/slides/slide18.xml><?xml version="1.0" encoding="utf-8"?>
+<p:sld xmlns:a="http://schemas.openxmlformats.org/drawingml/2006/main" xmlns:r="http://schemas.openxmlformats.org/officeDocument/2006/relationships" xmlns:p="http://schemas.openxmlformats.org/presentationml/2006/main">
+  <p:cSld>
+    <p:spTree>
+      <p:nvGrpSpPr>
+        <p:cNvPr id="1" name=""/>
+        <p:cNvGrpSpPr/>
+        <p:nvPr/>
+      </p:nvGrpSpPr>
+      <p:grpSpPr>
+        <a:xfrm>
+          <a:off x="0" y="0"/>
+          <a:ext cx="0" cy="0"/>
+          <a:chOff x="0" y="0"/>
+          <a:chExt cx="0" cy="0"/>
+        </a:xfrm>
+      </p:grpSpPr>
+      <p:sp>
+        <p:nvSpPr>
+          <p:cNvPr id="2" name="Title 1"/>
+          <p:cNvSpPr>
+            <a:spLocks noGrp="1"/>
+          </p:cNvSpPr>
+          <p:nvPr>
+            <p:ph type="title"/>
+          </p:nvPr>
+        </p:nvSpPr>
+        <p:spPr/>
+        <p:txBody>
+          <a:bodyPr>
+            <a:normAutofit/>
+          </a:bodyPr>
+          <a:lstStyle/>
+          <a:p>
+            <a:r>
+              <a:rPr lang="en-US" dirty="0"/>
+              <a:t>Template Method</a:t>
+            </a:r>
+          </a:p>
+        </p:txBody>
+      </p:sp>
+      <p:sp>
+        <p:nvSpPr>
+          <p:cNvPr id="3" name="Content Placeholder 2"/>
+          <p:cNvSpPr>
+            <a:spLocks noGrp="1"/>
+          </p:cNvSpPr>
+          <p:nvPr>
+            <p:ph idx="1"/>
+          </p:nvPr>
+        </p:nvSpPr>
+        <p:spPr/>
+        <p:txBody>
+          <a:bodyPr/>
+          <a:lstStyle/>
+          <a:p>
+            <a:pPr>
+              <a:buClr>
+                <a:schemeClr val="accent5">
+                  <a:lumMod val="50000"/>
+                </a:schemeClr>
+              </a:buClr>
+              <a:buFont typeface="Wingdings 2" panose="05020102010507070707" pitchFamily="18" charset="2"/>
+              <a:buChar char="Ë"/>
+            </a:pPr>
+            <a:r>
+              <a:rPr lang="en-US" dirty="0"/>
+              <a:t> </a:t>
+            </a:r>
+            <a:r>
+              <a:rPr lang="en-US" dirty="0" err="1"/>
               <a:t>Facilite</a:t>
             </a:r>
             <a:r>
@@ -8431,7 +9303,7 @@
 </p:sld>
 </file>
 
-<file path=ppt/slides/slide17.xml><?xml version="1.0" encoding="utf-8"?>
+<file path=ppt/slides/slide19.xml><?xml version="1.0" encoding="utf-8"?>
 <p:sld xmlns:a="http://schemas.openxmlformats.org/drawingml/2006/main" xmlns:r="http://schemas.openxmlformats.org/officeDocument/2006/relationships" xmlns:p="http://schemas.openxmlformats.org/presentationml/2006/main">
   <p:cSld>
     <p:spTree>
@@ -8523,123 +9395,6 @@
     <p:extLst>
       <p:ext uri="{BB962C8B-B14F-4D97-AF65-F5344CB8AC3E}">
         <p14:creationId xmlns:p14="http://schemas.microsoft.com/office/powerpoint/2010/main" val="1488238967"/>
-      </p:ext>
-    </p:extLst>
-  </p:cSld>
-  <p:clrMapOvr>
-    <a:masterClrMapping/>
-  </p:clrMapOvr>
-</p:sld>
-</file>
-
-<file path=ppt/slides/slide18.xml><?xml version="1.0" encoding="utf-8"?>
-<p:sld xmlns:a="http://schemas.openxmlformats.org/drawingml/2006/main" xmlns:r="http://schemas.openxmlformats.org/officeDocument/2006/relationships" xmlns:p="http://schemas.openxmlformats.org/presentationml/2006/main">
-  <p:cSld>
-    <p:spTree>
-      <p:nvGrpSpPr>
-        <p:cNvPr id="1" name=""/>
-        <p:cNvGrpSpPr/>
-        <p:nvPr/>
-      </p:nvGrpSpPr>
-      <p:grpSpPr>
-        <a:xfrm>
-          <a:off x="0" y="0"/>
-          <a:ext cx="0" cy="0"/>
-          <a:chOff x="0" y="0"/>
-          <a:chExt cx="0" cy="0"/>
-        </a:xfrm>
-      </p:grpSpPr>
-      <p:pic>
-        <p:nvPicPr>
-          <p:cNvPr id="6" name="Picture 2" descr="H:\Tech\key logo.jpeg"/>
-          <p:cNvPicPr>
-            <a:picLocks noChangeAspect="1" noChangeArrowheads="1"/>
-          </p:cNvPicPr>
-          <p:nvPr/>
-        </p:nvPicPr>
-        <p:blipFill>
-          <a:blip r:embed="rId2">
-            <a:extLst>
-              <a:ext uri="{28A0092B-C50C-407E-A947-70E740481C1C}">
-                <a14:useLocalDpi xmlns:a14="http://schemas.microsoft.com/office/drawing/2010/main" val="0"/>
-              </a:ext>
-            </a:extLst>
-          </a:blip>
-          <a:srcRect/>
-          <a:stretch>
-            <a:fillRect/>
-          </a:stretch>
-        </p:blipFill>
-        <p:spPr bwMode="auto">
-          <a:xfrm>
-            <a:off x="1547664" y="2996951"/>
-            <a:ext cx="1712292" cy="1712292"/>
-          </a:xfrm>
-          <a:prstGeom prst="rect">
-            <a:avLst/>
-          </a:prstGeom>
-          <a:noFill/>
-          <a:extLst>
-            <a:ext uri="{909E8E84-426E-40DD-AFC4-6F175D3DCCD1}">
-              <a14:hiddenFill xmlns:a14="http://schemas.microsoft.com/office/drawing/2010/main">
-                <a:solidFill>
-                  <a:srgbClr val="FFFFFF"/>
-                </a:solidFill>
-              </a14:hiddenFill>
-            </a:ext>
-          </a:extLst>
-        </p:spPr>
-      </p:pic>
-      <p:pic>
-        <p:nvPicPr>
-          <p:cNvPr id="7" name="Picture 8" descr="H:\Tech\gang-of-four.gif"/>
-          <p:cNvPicPr>
-            <a:picLocks noChangeAspect="1" noChangeArrowheads="1"/>
-          </p:cNvPicPr>
-          <p:nvPr/>
-        </p:nvPicPr>
-        <p:blipFill>
-          <a:blip r:embed="rId3">
-            <a:extLst>
-              <a:ext uri="{28A0092B-C50C-407E-A947-70E740481C1C}">
-                <a14:useLocalDpi xmlns:a14="http://schemas.microsoft.com/office/drawing/2010/main" val="0"/>
-              </a:ext>
-            </a:extLst>
-          </a:blip>
-          <a:srcRect/>
-          <a:stretch>
-            <a:fillRect/>
-          </a:stretch>
-        </p:blipFill>
-        <p:spPr bwMode="auto">
-          <a:xfrm>
-            <a:off x="4716016" y="1656253"/>
-            <a:ext cx="3528392" cy="4393689"/>
-          </a:xfrm>
-          <a:prstGeom prst="rect">
-            <a:avLst/>
-          </a:prstGeom>
-          <a:noFill/>
-          <a:ln>
-            <a:solidFill>
-              <a:schemeClr val="accent1"/>
-            </a:solidFill>
-          </a:ln>
-          <a:extLst>
-            <a:ext uri="{909E8E84-426E-40DD-AFC4-6F175D3DCCD1}">
-              <a14:hiddenFill xmlns:a14="http://schemas.microsoft.com/office/drawing/2010/main">
-                <a:solidFill>
-                  <a:srgbClr val="FFFFFF"/>
-                </a:solidFill>
-              </a14:hiddenFill>
-            </a:ext>
-          </a:extLst>
-        </p:spPr>
-      </p:pic>
-    </p:spTree>
-    <p:extLst>
-      <p:ext uri="{BB962C8B-B14F-4D97-AF65-F5344CB8AC3E}">
-        <p14:creationId xmlns:p14="http://schemas.microsoft.com/office/powerpoint/2010/main" val="2393032146"/>
       </p:ext>
     </p:extLst>
   </p:cSld>
@@ -9588,6 +10343,123 @@
       <p:bldP spid="4" grpId="0" uiExpand="1" build="p"/>
     </p:bldLst>
   </p:timing>
+</p:sld>
+</file>
+
+<file path=ppt/slides/slide20.xml><?xml version="1.0" encoding="utf-8"?>
+<p:sld xmlns:a="http://schemas.openxmlformats.org/drawingml/2006/main" xmlns:r="http://schemas.openxmlformats.org/officeDocument/2006/relationships" xmlns:p="http://schemas.openxmlformats.org/presentationml/2006/main">
+  <p:cSld>
+    <p:spTree>
+      <p:nvGrpSpPr>
+        <p:cNvPr id="1" name=""/>
+        <p:cNvGrpSpPr/>
+        <p:nvPr/>
+      </p:nvGrpSpPr>
+      <p:grpSpPr>
+        <a:xfrm>
+          <a:off x="0" y="0"/>
+          <a:ext cx="0" cy="0"/>
+          <a:chOff x="0" y="0"/>
+          <a:chExt cx="0" cy="0"/>
+        </a:xfrm>
+      </p:grpSpPr>
+      <p:pic>
+        <p:nvPicPr>
+          <p:cNvPr id="6" name="Picture 2" descr="H:\Tech\key logo.jpeg"/>
+          <p:cNvPicPr>
+            <a:picLocks noChangeAspect="1" noChangeArrowheads="1"/>
+          </p:cNvPicPr>
+          <p:nvPr/>
+        </p:nvPicPr>
+        <p:blipFill>
+          <a:blip r:embed="rId2">
+            <a:extLst>
+              <a:ext uri="{28A0092B-C50C-407E-A947-70E740481C1C}">
+                <a14:useLocalDpi xmlns:a14="http://schemas.microsoft.com/office/drawing/2010/main" val="0"/>
+              </a:ext>
+            </a:extLst>
+          </a:blip>
+          <a:srcRect/>
+          <a:stretch>
+            <a:fillRect/>
+          </a:stretch>
+        </p:blipFill>
+        <p:spPr bwMode="auto">
+          <a:xfrm>
+            <a:off x="1547664" y="2996951"/>
+            <a:ext cx="1712292" cy="1712292"/>
+          </a:xfrm>
+          <a:prstGeom prst="rect">
+            <a:avLst/>
+          </a:prstGeom>
+          <a:noFill/>
+          <a:extLst>
+            <a:ext uri="{909E8E84-426E-40DD-AFC4-6F175D3DCCD1}">
+              <a14:hiddenFill xmlns:a14="http://schemas.microsoft.com/office/drawing/2010/main">
+                <a:solidFill>
+                  <a:srgbClr val="FFFFFF"/>
+                </a:solidFill>
+              </a14:hiddenFill>
+            </a:ext>
+          </a:extLst>
+        </p:spPr>
+      </p:pic>
+      <p:pic>
+        <p:nvPicPr>
+          <p:cNvPr id="7" name="Picture 8" descr="H:\Tech\gang-of-four.gif"/>
+          <p:cNvPicPr>
+            <a:picLocks noChangeAspect="1" noChangeArrowheads="1"/>
+          </p:cNvPicPr>
+          <p:nvPr/>
+        </p:nvPicPr>
+        <p:blipFill>
+          <a:blip r:embed="rId3">
+            <a:extLst>
+              <a:ext uri="{28A0092B-C50C-407E-A947-70E740481C1C}">
+                <a14:useLocalDpi xmlns:a14="http://schemas.microsoft.com/office/drawing/2010/main" val="0"/>
+              </a:ext>
+            </a:extLst>
+          </a:blip>
+          <a:srcRect/>
+          <a:stretch>
+            <a:fillRect/>
+          </a:stretch>
+        </p:blipFill>
+        <p:spPr bwMode="auto">
+          <a:xfrm>
+            <a:off x="4716016" y="1656253"/>
+            <a:ext cx="3528392" cy="4393689"/>
+          </a:xfrm>
+          <a:prstGeom prst="rect">
+            <a:avLst/>
+          </a:prstGeom>
+          <a:noFill/>
+          <a:ln>
+            <a:solidFill>
+              <a:schemeClr val="accent1"/>
+            </a:solidFill>
+          </a:ln>
+          <a:extLst>
+            <a:ext uri="{909E8E84-426E-40DD-AFC4-6F175D3DCCD1}">
+              <a14:hiddenFill xmlns:a14="http://schemas.microsoft.com/office/drawing/2010/main">
+                <a:solidFill>
+                  <a:srgbClr val="FFFFFF"/>
+                </a:solidFill>
+              </a14:hiddenFill>
+            </a:ext>
+          </a:extLst>
+        </p:spPr>
+      </p:pic>
+    </p:spTree>
+    <p:extLst>
+      <p:ext uri="{BB962C8B-B14F-4D97-AF65-F5344CB8AC3E}">
+        <p14:creationId xmlns:p14="http://schemas.microsoft.com/office/powerpoint/2010/main" val="2393032146"/>
+      </p:ext>
+    </p:extLst>
+  </p:cSld>
+  <p:clrMapOvr>
+    <a:masterClrMapping/>
+  </p:clrMapOvr>
 </p:sld>
 </file>
 

</xml_diff>